<commit_message>
Post-processing current data into spreadsheet
</commit_message>
<xml_diff>
--- a/Tests/Summary_graphs.pptx
+++ b/Tests/Summary_graphs.pptx
@@ -5,7 +5,7 @@
     <p:sldMasterId id="2147483648" r:id="rId1"/>
   </p:sldMasterIdLst>
   <p:notesMasterIdLst>
-    <p:notesMasterId r:id="rId7"/>
+    <p:notesMasterId r:id="rId10"/>
   </p:notesMasterIdLst>
   <p:sldIdLst>
     <p:sldId id="256" r:id="rId2"/>
@@ -13,6 +13,9 @@
     <p:sldId id="257" r:id="rId4"/>
     <p:sldId id="259" r:id="rId5"/>
     <p:sldId id="260" r:id="rId6"/>
+    <p:sldId id="262" r:id="rId7"/>
+    <p:sldId id="261" r:id="rId8"/>
+    <p:sldId id="263" r:id="rId9"/>
   </p:sldIdLst>
   <p:sldSz cx="12192000" cy="6858000"/>
   <p:notesSz cx="6858000" cy="9144000"/>
@@ -201,7 +204,7 @@
           <a:p>
             <a:fld id="{B019A618-63AB-4F89-8C61-5DE094D48502}" type="datetimeFigureOut">
               <a:rPr lang="en-CA" smtClean="0"/>
-              <a:t>2019-01-11</a:t>
+              <a:t>2019-01-16</a:t>
             </a:fld>
             <a:endParaRPr lang="en-CA"/>
           </a:p>
@@ -732,6 +735,354 @@
 </p:notes>
 </file>
 
+<file path=ppt/notesSlides/notesSlide4.xml><?xml version="1.0" encoding="utf-8"?>
+<p:notes xmlns:a="http://schemas.openxmlformats.org/drawingml/2006/main" xmlns:r="http://schemas.openxmlformats.org/officeDocument/2006/relationships" xmlns:p="http://schemas.openxmlformats.org/presentationml/2006/main">
+  <p:cSld>
+    <p:spTree>
+      <p:nvGrpSpPr>
+        <p:cNvPr id="1" name=""/>
+        <p:cNvGrpSpPr/>
+        <p:nvPr/>
+      </p:nvGrpSpPr>
+      <p:grpSpPr>
+        <a:xfrm>
+          <a:off x="0" y="0"/>
+          <a:ext cx="0" cy="0"/>
+          <a:chOff x="0" y="0"/>
+          <a:chExt cx="0" cy="0"/>
+        </a:xfrm>
+      </p:grpSpPr>
+      <p:sp>
+        <p:nvSpPr>
+          <p:cNvPr id="2" name="Slide Image Placeholder 1"/>
+          <p:cNvSpPr>
+            <a:spLocks noGrp="1" noRot="1" noChangeAspect="1"/>
+          </p:cNvSpPr>
+          <p:nvPr>
+            <p:ph type="sldImg"/>
+          </p:nvPr>
+        </p:nvSpPr>
+        <p:spPr/>
+      </p:sp>
+      <p:sp>
+        <p:nvSpPr>
+          <p:cNvPr id="3" name="Notes Placeholder 2"/>
+          <p:cNvSpPr>
+            <a:spLocks noGrp="1"/>
+          </p:cNvSpPr>
+          <p:nvPr>
+            <p:ph type="body" idx="1"/>
+          </p:nvPr>
+        </p:nvSpPr>
+        <p:spPr/>
+        <p:txBody>
+          <a:bodyPr/>
+          <a:lstStyle/>
+          <a:p>
+            <a:r>
+              <a:rPr lang="en-CA" dirty="0"/>
+              <a:t>Reset folder numbering</a:t>
+            </a:r>
+          </a:p>
+        </p:txBody>
+      </p:sp>
+      <p:sp>
+        <p:nvSpPr>
+          <p:cNvPr id="4" name="Slide Number Placeholder 3"/>
+          <p:cNvSpPr>
+            <a:spLocks noGrp="1"/>
+          </p:cNvSpPr>
+          <p:nvPr>
+            <p:ph type="sldNum" sz="quarter" idx="10"/>
+          </p:nvPr>
+        </p:nvSpPr>
+        <p:spPr/>
+        <p:txBody>
+          <a:bodyPr/>
+          <a:lstStyle/>
+          <a:p>
+            <a:fld id="{E1551DFB-0826-40DD-ADF9-7812F4854986}" type="slidenum">
+              <a:rPr lang="en-CA" smtClean="0"/>
+              <a:t>5</a:t>
+            </a:fld>
+            <a:endParaRPr lang="en-CA"/>
+          </a:p>
+        </p:txBody>
+      </p:sp>
+    </p:spTree>
+    <p:extLst>
+      <p:ext uri="{BB962C8B-B14F-4D97-AF65-F5344CB8AC3E}">
+        <p14:creationId xmlns:p14="http://schemas.microsoft.com/office/powerpoint/2010/main" val="1024091313"/>
+      </p:ext>
+    </p:extLst>
+  </p:cSld>
+  <p:clrMapOvr>
+    <a:masterClrMapping/>
+  </p:clrMapOvr>
+</p:notes>
+</file>
+
+<file path=ppt/notesSlides/notesSlide5.xml><?xml version="1.0" encoding="utf-8"?>
+<p:notes xmlns:a="http://schemas.openxmlformats.org/drawingml/2006/main" xmlns:r="http://schemas.openxmlformats.org/officeDocument/2006/relationships" xmlns:p="http://schemas.openxmlformats.org/presentationml/2006/main">
+  <p:cSld>
+    <p:spTree>
+      <p:nvGrpSpPr>
+        <p:cNvPr id="1" name=""/>
+        <p:cNvGrpSpPr/>
+        <p:nvPr/>
+      </p:nvGrpSpPr>
+      <p:grpSpPr>
+        <a:xfrm>
+          <a:off x="0" y="0"/>
+          <a:ext cx="0" cy="0"/>
+          <a:chOff x="0" y="0"/>
+          <a:chExt cx="0" cy="0"/>
+        </a:xfrm>
+      </p:grpSpPr>
+      <p:sp>
+        <p:nvSpPr>
+          <p:cNvPr id="2" name="Slide Image Placeholder 1"/>
+          <p:cNvSpPr>
+            <a:spLocks noGrp="1" noRot="1" noChangeAspect="1"/>
+          </p:cNvSpPr>
+          <p:nvPr>
+            <p:ph type="sldImg"/>
+          </p:nvPr>
+        </p:nvSpPr>
+        <p:spPr/>
+      </p:sp>
+      <p:sp>
+        <p:nvSpPr>
+          <p:cNvPr id="3" name="Notes Placeholder 2"/>
+          <p:cNvSpPr>
+            <a:spLocks noGrp="1"/>
+          </p:cNvSpPr>
+          <p:nvPr>
+            <p:ph type="body" idx="1"/>
+          </p:nvPr>
+        </p:nvSpPr>
+        <p:spPr/>
+        <p:txBody>
+          <a:bodyPr/>
+          <a:lstStyle/>
+          <a:p>
+            <a:r>
+              <a:rPr lang="en-CA" dirty="0"/>
+              <a:t>Flux</a:t>
+            </a:r>
+          </a:p>
+        </p:txBody>
+      </p:sp>
+      <p:sp>
+        <p:nvSpPr>
+          <p:cNvPr id="4" name="Slide Number Placeholder 3"/>
+          <p:cNvSpPr>
+            <a:spLocks noGrp="1"/>
+          </p:cNvSpPr>
+          <p:nvPr>
+            <p:ph type="sldNum" sz="quarter" idx="10"/>
+          </p:nvPr>
+        </p:nvSpPr>
+        <p:spPr/>
+        <p:txBody>
+          <a:bodyPr/>
+          <a:lstStyle/>
+          <a:p>
+            <a:fld id="{E1551DFB-0826-40DD-ADF9-7812F4854986}" type="slidenum">
+              <a:rPr lang="en-CA" smtClean="0"/>
+              <a:t>6</a:t>
+            </a:fld>
+            <a:endParaRPr lang="en-CA"/>
+          </a:p>
+        </p:txBody>
+      </p:sp>
+    </p:spTree>
+    <p:extLst>
+      <p:ext uri="{BB962C8B-B14F-4D97-AF65-F5344CB8AC3E}">
+        <p14:creationId xmlns:p14="http://schemas.microsoft.com/office/powerpoint/2010/main" val="380938291"/>
+      </p:ext>
+    </p:extLst>
+  </p:cSld>
+  <p:clrMapOvr>
+    <a:masterClrMapping/>
+  </p:clrMapOvr>
+</p:notes>
+</file>
+
+<file path=ppt/notesSlides/notesSlide6.xml><?xml version="1.0" encoding="utf-8"?>
+<p:notes xmlns:a="http://schemas.openxmlformats.org/drawingml/2006/main" xmlns:r="http://schemas.openxmlformats.org/officeDocument/2006/relationships" xmlns:p="http://schemas.openxmlformats.org/presentationml/2006/main">
+  <p:cSld>
+    <p:spTree>
+      <p:nvGrpSpPr>
+        <p:cNvPr id="1" name=""/>
+        <p:cNvGrpSpPr/>
+        <p:nvPr/>
+      </p:nvGrpSpPr>
+      <p:grpSpPr>
+        <a:xfrm>
+          <a:off x="0" y="0"/>
+          <a:ext cx="0" cy="0"/>
+          <a:chOff x="0" y="0"/>
+          <a:chExt cx="0" cy="0"/>
+        </a:xfrm>
+      </p:grpSpPr>
+      <p:sp>
+        <p:nvSpPr>
+          <p:cNvPr id="2" name="Slide Image Placeholder 1"/>
+          <p:cNvSpPr>
+            <a:spLocks noGrp="1" noRot="1" noChangeAspect="1"/>
+          </p:cNvSpPr>
+          <p:nvPr>
+            <p:ph type="sldImg"/>
+          </p:nvPr>
+        </p:nvSpPr>
+        <p:spPr/>
+      </p:sp>
+      <p:sp>
+        <p:nvSpPr>
+          <p:cNvPr id="3" name="Notes Placeholder 2"/>
+          <p:cNvSpPr>
+            <a:spLocks noGrp="1"/>
+          </p:cNvSpPr>
+          <p:nvPr>
+            <p:ph type="body" idx="1"/>
+          </p:nvPr>
+        </p:nvSpPr>
+        <p:spPr/>
+        <p:txBody>
+          <a:bodyPr/>
+          <a:lstStyle/>
+          <a:p>
+            <a:r>
+              <a:rPr lang="en-CA" dirty="0"/>
+              <a:t>Flux</a:t>
+            </a:r>
+          </a:p>
+        </p:txBody>
+      </p:sp>
+      <p:sp>
+        <p:nvSpPr>
+          <p:cNvPr id="4" name="Slide Number Placeholder 3"/>
+          <p:cNvSpPr>
+            <a:spLocks noGrp="1"/>
+          </p:cNvSpPr>
+          <p:nvPr>
+            <p:ph type="sldNum" sz="quarter" idx="10"/>
+          </p:nvPr>
+        </p:nvSpPr>
+        <p:spPr/>
+        <p:txBody>
+          <a:bodyPr/>
+          <a:lstStyle/>
+          <a:p>
+            <a:fld id="{E1551DFB-0826-40DD-ADF9-7812F4854986}" type="slidenum">
+              <a:rPr lang="en-CA" smtClean="0"/>
+              <a:t>7</a:t>
+            </a:fld>
+            <a:endParaRPr lang="en-CA"/>
+          </a:p>
+        </p:txBody>
+      </p:sp>
+    </p:spTree>
+    <p:extLst>
+      <p:ext uri="{BB962C8B-B14F-4D97-AF65-F5344CB8AC3E}">
+        <p14:creationId xmlns:p14="http://schemas.microsoft.com/office/powerpoint/2010/main" val="2142720675"/>
+      </p:ext>
+    </p:extLst>
+  </p:cSld>
+  <p:clrMapOvr>
+    <a:masterClrMapping/>
+  </p:clrMapOvr>
+</p:notes>
+</file>
+
+<file path=ppt/notesSlides/notesSlide7.xml><?xml version="1.0" encoding="utf-8"?>
+<p:notes xmlns:a="http://schemas.openxmlformats.org/drawingml/2006/main" xmlns:r="http://schemas.openxmlformats.org/officeDocument/2006/relationships" xmlns:p="http://schemas.openxmlformats.org/presentationml/2006/main">
+  <p:cSld>
+    <p:spTree>
+      <p:nvGrpSpPr>
+        <p:cNvPr id="1" name=""/>
+        <p:cNvGrpSpPr/>
+        <p:nvPr/>
+      </p:nvGrpSpPr>
+      <p:grpSpPr>
+        <a:xfrm>
+          <a:off x="0" y="0"/>
+          <a:ext cx="0" cy="0"/>
+          <a:chOff x="0" y="0"/>
+          <a:chExt cx="0" cy="0"/>
+        </a:xfrm>
+      </p:grpSpPr>
+      <p:sp>
+        <p:nvSpPr>
+          <p:cNvPr id="2" name="Slide Image Placeholder 1"/>
+          <p:cNvSpPr>
+            <a:spLocks noGrp="1" noRot="1" noChangeAspect="1"/>
+          </p:cNvSpPr>
+          <p:nvPr>
+            <p:ph type="sldImg"/>
+          </p:nvPr>
+        </p:nvSpPr>
+        <p:spPr/>
+      </p:sp>
+      <p:sp>
+        <p:nvSpPr>
+          <p:cNvPr id="3" name="Notes Placeholder 2"/>
+          <p:cNvSpPr>
+            <a:spLocks noGrp="1"/>
+          </p:cNvSpPr>
+          <p:nvPr>
+            <p:ph type="body" idx="1"/>
+          </p:nvPr>
+        </p:nvSpPr>
+        <p:spPr/>
+        <p:txBody>
+          <a:bodyPr/>
+          <a:lstStyle/>
+          <a:p>
+            <a:r>
+              <a:rPr lang="en-CA" dirty="0"/>
+              <a:t>Flux</a:t>
+            </a:r>
+          </a:p>
+        </p:txBody>
+      </p:sp>
+      <p:sp>
+        <p:nvSpPr>
+          <p:cNvPr id="4" name="Slide Number Placeholder 3"/>
+          <p:cNvSpPr>
+            <a:spLocks noGrp="1"/>
+          </p:cNvSpPr>
+          <p:nvPr>
+            <p:ph type="sldNum" sz="quarter" idx="10"/>
+          </p:nvPr>
+        </p:nvSpPr>
+        <p:spPr/>
+        <p:txBody>
+          <a:bodyPr/>
+          <a:lstStyle/>
+          <a:p>
+            <a:fld id="{E1551DFB-0826-40DD-ADF9-7812F4854986}" type="slidenum">
+              <a:rPr lang="en-CA" smtClean="0"/>
+              <a:t>8</a:t>
+            </a:fld>
+            <a:endParaRPr lang="en-CA"/>
+          </a:p>
+        </p:txBody>
+      </p:sp>
+    </p:spTree>
+    <p:extLst>
+      <p:ext uri="{BB962C8B-B14F-4D97-AF65-F5344CB8AC3E}">
+        <p14:creationId xmlns:p14="http://schemas.microsoft.com/office/powerpoint/2010/main" val="1640568099"/>
+      </p:ext>
+    </p:extLst>
+  </p:cSld>
+  <p:clrMapOvr>
+    <a:masterClrMapping/>
+  </p:clrMapOvr>
+</p:notes>
+</file>
+
 <file path=ppt/slideLayouts/slideLayout1.xml><?xml version="1.0" encoding="utf-8"?>
 <p:sldLayout xmlns:a="http://schemas.openxmlformats.org/drawingml/2006/main" xmlns:r="http://schemas.openxmlformats.org/officeDocument/2006/relationships" xmlns:p="http://schemas.openxmlformats.org/presentationml/2006/main" type="title" preserve="1">
   <p:cSld name="Title Slide">
@@ -881,7 +1232,7 @@
           <a:p>
             <a:fld id="{7B325132-34A0-4949-A128-7FA77212AB09}" type="datetimeFigureOut">
               <a:rPr lang="en-CA" smtClean="0"/>
-              <a:t>2019-01-11</a:t>
+              <a:t>2019-01-16</a:t>
             </a:fld>
             <a:endParaRPr lang="en-CA"/>
           </a:p>
@@ -1081,7 +1432,7 @@
           <a:p>
             <a:fld id="{7B325132-34A0-4949-A128-7FA77212AB09}" type="datetimeFigureOut">
               <a:rPr lang="en-CA" smtClean="0"/>
-              <a:t>2019-01-11</a:t>
+              <a:t>2019-01-16</a:t>
             </a:fld>
             <a:endParaRPr lang="en-CA"/>
           </a:p>
@@ -1291,7 +1642,7 @@
           <a:p>
             <a:fld id="{7B325132-34A0-4949-A128-7FA77212AB09}" type="datetimeFigureOut">
               <a:rPr lang="en-CA" smtClean="0"/>
-              <a:t>2019-01-11</a:t>
+              <a:t>2019-01-16</a:t>
             </a:fld>
             <a:endParaRPr lang="en-CA"/>
           </a:p>
@@ -1491,7 +1842,7 @@
           <a:p>
             <a:fld id="{7B325132-34A0-4949-A128-7FA77212AB09}" type="datetimeFigureOut">
               <a:rPr lang="en-CA" smtClean="0"/>
-              <a:t>2019-01-11</a:t>
+              <a:t>2019-01-16</a:t>
             </a:fld>
             <a:endParaRPr lang="en-CA"/>
           </a:p>
@@ -1767,7 +2118,7 @@
           <a:p>
             <a:fld id="{7B325132-34A0-4949-A128-7FA77212AB09}" type="datetimeFigureOut">
               <a:rPr lang="en-CA" smtClean="0"/>
-              <a:t>2019-01-11</a:t>
+              <a:t>2019-01-16</a:t>
             </a:fld>
             <a:endParaRPr lang="en-CA"/>
           </a:p>
@@ -2035,7 +2386,7 @@
           <a:p>
             <a:fld id="{7B325132-34A0-4949-A128-7FA77212AB09}" type="datetimeFigureOut">
               <a:rPr lang="en-CA" smtClean="0"/>
-              <a:t>2019-01-11</a:t>
+              <a:t>2019-01-16</a:t>
             </a:fld>
             <a:endParaRPr lang="en-CA"/>
           </a:p>
@@ -2450,7 +2801,7 @@
           <a:p>
             <a:fld id="{7B325132-34A0-4949-A128-7FA77212AB09}" type="datetimeFigureOut">
               <a:rPr lang="en-CA" smtClean="0"/>
-              <a:t>2019-01-11</a:t>
+              <a:t>2019-01-16</a:t>
             </a:fld>
             <a:endParaRPr lang="en-CA"/>
           </a:p>
@@ -2592,7 +2943,7 @@
           <a:p>
             <a:fld id="{7B325132-34A0-4949-A128-7FA77212AB09}" type="datetimeFigureOut">
               <a:rPr lang="en-CA" smtClean="0"/>
-              <a:t>2019-01-11</a:t>
+              <a:t>2019-01-16</a:t>
             </a:fld>
             <a:endParaRPr lang="en-CA"/>
           </a:p>
@@ -2705,7 +3056,7 @@
           <a:p>
             <a:fld id="{7B325132-34A0-4949-A128-7FA77212AB09}" type="datetimeFigureOut">
               <a:rPr lang="en-CA" smtClean="0"/>
-              <a:t>2019-01-11</a:t>
+              <a:t>2019-01-16</a:t>
             </a:fld>
             <a:endParaRPr lang="en-CA"/>
           </a:p>
@@ -3018,7 +3369,7 @@
           <a:p>
             <a:fld id="{7B325132-34A0-4949-A128-7FA77212AB09}" type="datetimeFigureOut">
               <a:rPr lang="en-CA" smtClean="0"/>
-              <a:t>2019-01-11</a:t>
+              <a:t>2019-01-16</a:t>
             </a:fld>
             <a:endParaRPr lang="en-CA"/>
           </a:p>
@@ -3307,7 +3658,7 @@
           <a:p>
             <a:fld id="{7B325132-34A0-4949-A128-7FA77212AB09}" type="datetimeFigureOut">
               <a:rPr lang="en-CA" smtClean="0"/>
-              <a:t>2019-01-11</a:t>
+              <a:t>2019-01-16</a:t>
             </a:fld>
             <a:endParaRPr lang="en-CA"/>
           </a:p>
@@ -3550,7 +3901,7 @@
           <a:p>
             <a:fld id="{7B325132-34A0-4949-A128-7FA77212AB09}" type="datetimeFigureOut">
               <a:rPr lang="en-CA" smtClean="0"/>
-              <a:t>2019-01-11</a:t>
+              <a:t>2019-01-16</a:t>
             </a:fld>
             <a:endParaRPr lang="en-CA"/>
           </a:p>
@@ -3986,11 +4337,13 @@
         <p:spPr>
           <a:xfrm>
             <a:off x="1524000" y="1132113"/>
-            <a:ext cx="4572000" cy="1654629"/>
+            <a:ext cx="4572000" cy="2969846"/>
           </a:xfrm>
         </p:spPr>
         <p:txBody>
-          <a:bodyPr/>
+          <a:bodyPr>
+            <a:normAutofit/>
+          </a:bodyPr>
           <a:lstStyle/>
           <a:p>
             <a:pPr algn="l"/>
@@ -4017,14 +4370,146 @@
               <a:t>=550</a:t>
             </a:r>
           </a:p>
-        </p:txBody>
-      </p:sp>
-      <p:sp>
-        <p:nvSpPr>
-          <p:cNvPr id="4" name="Subtitle 2">
-            <a:extLst>
-              <a:ext uri="{FF2B5EF4-FFF2-40B4-BE49-F238E27FC236}">
-                <a16:creationId xmlns:a16="http://schemas.microsoft.com/office/drawing/2014/main" id="{441D23C9-150E-4F25-9614-7576B8B0559B}"/>
+          <a:p>
+            <a:pPr algn="l"/>
+            <a:r>
+              <a:rPr lang="en-CA" dirty="0"/>
+              <a:t>Flux=400 MW/m2</a:t>
+            </a:r>
+          </a:p>
+          <a:p>
+            <a:pPr algn="l"/>
+            <a:r>
+              <a:rPr lang="en-CA" dirty="0" err="1"/>
+              <a:t>T_ign</a:t>
+            </a:r>
+            <a:r>
+              <a:rPr lang="en-CA" dirty="0"/>
+              <a:t>=1200 K</a:t>
+            </a:r>
+          </a:p>
+        </p:txBody>
+      </p:sp>
+      <p:sp>
+        <p:nvSpPr>
+          <p:cNvPr id="2" name="TextBox 1">
+            <a:extLst>
+              <a:ext uri="{FF2B5EF4-FFF2-40B4-BE49-F238E27FC236}">
+                <a16:creationId xmlns:a16="http://schemas.microsoft.com/office/drawing/2014/main" id="{DA4E6C74-1D3B-40B0-9D38-4486ACFDDA5E}"/>
+              </a:ext>
+            </a:extLst>
+          </p:cNvPr>
+          <p:cNvSpPr txBox="1"/>
+          <p:nvPr/>
+        </p:nvSpPr>
+        <p:spPr>
+          <a:xfrm>
+            <a:off x="2119086" y="4267200"/>
+            <a:ext cx="2612571" cy="369332"/>
+          </a:xfrm>
+          <a:prstGeom prst="rect">
+            <a:avLst/>
+          </a:prstGeom>
+          <a:noFill/>
+        </p:spPr>
+        <p:txBody>
+          <a:bodyPr wrap="square" rtlCol="0">
+            <a:spAutoFit/>
+          </a:bodyPr>
+          <a:lstStyle/>
+          <a:p>
+            <a:r>
+              <a:rPr lang="en-CA" dirty="0"/>
+              <a:t>Tests can overwrite: 4,5</a:t>
+            </a:r>
+          </a:p>
+        </p:txBody>
+      </p:sp>
+      <p:sp>
+        <p:nvSpPr>
+          <p:cNvPr id="5" name="TextBox 4">
+            <a:extLst>
+              <a:ext uri="{FF2B5EF4-FFF2-40B4-BE49-F238E27FC236}">
+                <a16:creationId xmlns:a16="http://schemas.microsoft.com/office/drawing/2014/main" id="{898150A5-E4D4-4673-8CF4-C78D89C085C1}"/>
+              </a:ext>
+            </a:extLst>
+          </p:cNvPr>
+          <p:cNvSpPr txBox="1"/>
+          <p:nvPr/>
+        </p:nvSpPr>
+        <p:spPr>
+          <a:xfrm>
+            <a:off x="2119085" y="4801773"/>
+            <a:ext cx="3265715" cy="923330"/>
+          </a:xfrm>
+          <a:prstGeom prst="rect">
+            <a:avLst/>
+          </a:prstGeom>
+          <a:noFill/>
+        </p:spPr>
+        <p:txBody>
+          <a:bodyPr wrap="square" rtlCol="0">
+            <a:spAutoFit/>
+          </a:bodyPr>
+          <a:lstStyle/>
+          <a:p>
+            <a:r>
+              <a:rPr lang="en-CA" dirty="0"/>
+              <a:t>Diverging parameters:</a:t>
+            </a:r>
+          </a:p>
+          <a:p>
+            <a:r>
+              <a:rPr lang="en-CA" dirty="0"/>
+              <a:t>-</a:t>
+            </a:r>
+            <a:r>
+              <a:rPr lang="en-CA" dirty="0" err="1"/>
+              <a:t>Ea</a:t>
+            </a:r>
+            <a:r>
+              <a:rPr lang="en-CA" dirty="0"/>
+              <a:t>=4000, A0=1e6, </a:t>
+            </a:r>
+            <a:r>
+              <a:rPr lang="en-CA" dirty="0" err="1"/>
+              <a:t>dH</a:t>
+            </a:r>
+            <a:r>
+              <a:rPr lang="en-CA" dirty="0"/>
+              <a:t>=300000</a:t>
+            </a:r>
+          </a:p>
+          <a:p>
+            <a:r>
+              <a:rPr lang="en-CA" dirty="0"/>
+              <a:t>-</a:t>
+            </a:r>
+            <a:r>
+              <a:rPr lang="en-CA" dirty="0" err="1"/>
+              <a:t>Ea</a:t>
+            </a:r>
+            <a:r>
+              <a:rPr lang="en-CA" dirty="0"/>
+              <a:t>=4000, A0=1e8, </a:t>
+            </a:r>
+            <a:r>
+              <a:rPr lang="en-CA" dirty="0" err="1"/>
+              <a:t>dH</a:t>
+            </a:r>
+            <a:r>
+              <a:rPr lang="en-CA" dirty="0"/>
+              <a:t>=300000</a:t>
+            </a:r>
+          </a:p>
+        </p:txBody>
+      </p:sp>
+      <p:sp>
+        <p:nvSpPr>
+          <p:cNvPr id="6" name="Subtitle 2">
+            <a:extLst>
+              <a:ext uri="{FF2B5EF4-FFF2-40B4-BE49-F238E27FC236}">
+                <a16:creationId xmlns:a16="http://schemas.microsoft.com/office/drawing/2014/main" id="{607B73C4-E7B8-4AF2-AE37-18515D621CC4}"/>
               </a:ext>
             </a:extLst>
           </p:cNvPr>
@@ -4035,7 +4520,7 @@
         </p:nvSpPr>
         <p:spPr>
           <a:xfrm>
-            <a:off x="6096000" y="1132114"/>
+            <a:off x="7620000" y="1132112"/>
             <a:ext cx="4572000" cy="1654629"/>
           </a:xfrm>
           <a:prstGeom prst="rect">
@@ -4239,10 +4724,10 @@
       </p:sp>
       <p:sp>
         <p:nvSpPr>
-          <p:cNvPr id="2" name="TextBox 1">
-            <a:extLst>
-              <a:ext uri="{FF2B5EF4-FFF2-40B4-BE49-F238E27FC236}">
-                <a16:creationId xmlns:a16="http://schemas.microsoft.com/office/drawing/2014/main" id="{DA4E6C74-1D3B-40B0-9D38-4486ACFDDA5E}"/>
+          <p:cNvPr id="7" name="TextBox 6">
+            <a:extLst>
+              <a:ext uri="{FF2B5EF4-FFF2-40B4-BE49-F238E27FC236}">
+                <a16:creationId xmlns:a16="http://schemas.microsoft.com/office/drawing/2014/main" id="{9460F882-FB5A-4BDB-9F48-5C2F419C2850}"/>
               </a:ext>
             </a:extLst>
           </p:cNvPr>
@@ -4251,42 +4736,7 @@
         </p:nvSpPr>
         <p:spPr>
           <a:xfrm>
-            <a:off x="2119086" y="4267200"/>
-            <a:ext cx="2612571" cy="369332"/>
-          </a:xfrm>
-          <a:prstGeom prst="rect">
-            <a:avLst/>
-          </a:prstGeom>
-          <a:noFill/>
-        </p:spPr>
-        <p:txBody>
-          <a:bodyPr wrap="square" rtlCol="0">
-            <a:spAutoFit/>
-          </a:bodyPr>
-          <a:lstStyle/>
-          <a:p>
-            <a:r>
-              <a:rPr lang="en-CA" dirty="0"/>
-              <a:t>Tests can overwrite: 4,5</a:t>
-            </a:r>
-          </a:p>
-        </p:txBody>
-      </p:sp>
-      <p:sp>
-        <p:nvSpPr>
-          <p:cNvPr id="5" name="TextBox 4">
-            <a:extLst>
-              <a:ext uri="{FF2B5EF4-FFF2-40B4-BE49-F238E27FC236}">
-                <a16:creationId xmlns:a16="http://schemas.microsoft.com/office/drawing/2014/main" id="{898150A5-E4D4-4673-8CF4-C78D89C085C1}"/>
-              </a:ext>
-            </a:extLst>
-          </p:cNvPr>
-          <p:cNvSpPr txBox="1"/>
-          <p:nvPr/>
-        </p:nvSpPr>
-        <p:spPr>
-          <a:xfrm>
-            <a:off x="2119085" y="4801773"/>
+            <a:off x="6902688" y="3429000"/>
             <a:ext cx="3265715" cy="923330"/>
           </a:xfrm>
           <a:prstGeom prst="rect">
@@ -4302,51 +4752,19 @@
           <a:p>
             <a:r>
               <a:rPr lang="en-CA" dirty="0"/>
-              <a:t>Diverging parameters:</a:t>
+              <a:t>Parameters tested:</a:t>
             </a:r>
           </a:p>
           <a:p>
             <a:r>
               <a:rPr lang="en-CA" dirty="0"/>
-              <a:t>-</a:t>
-            </a:r>
-            <a:r>
-              <a:rPr lang="en-CA" dirty="0" err="1"/>
-              <a:t>Ea</a:t>
-            </a:r>
+              <a:t>-Arrhenius parameters</a:t>
+            </a:r>
+          </a:p>
+          <a:p>
             <a:r>
               <a:rPr lang="en-CA" dirty="0"/>
-              <a:t>=4000, A0=1e6, </a:t>
-            </a:r>
-            <a:r>
-              <a:rPr lang="en-CA" dirty="0" err="1"/>
-              <a:t>dH</a:t>
-            </a:r>
-            <a:r>
-              <a:rPr lang="en-CA" dirty="0"/>
-              <a:t>=300000</a:t>
-            </a:r>
-          </a:p>
-          <a:p>
-            <a:r>
-              <a:rPr lang="en-CA" dirty="0"/>
-              <a:t>-</a:t>
-            </a:r>
-            <a:r>
-              <a:rPr lang="en-CA" dirty="0" err="1"/>
-              <a:t>Ea</a:t>
-            </a:r>
-            <a:r>
-              <a:rPr lang="en-CA" dirty="0"/>
-              <a:t>=4000, A0=1e8, </a:t>
-            </a:r>
-            <a:r>
-              <a:rPr lang="en-CA" dirty="0" err="1"/>
-              <a:t>dH</a:t>
-            </a:r>
-            <a:r>
-              <a:rPr lang="en-CA" dirty="0"/>
-              <a:t>=300000</a:t>
+              <a:t>-Enthalpy of combustion</a:t>
             </a:r>
           </a:p>
         </p:txBody>
@@ -5485,7 +5903,7 @@
         </p:blipFill>
         <p:spPr>
           <a:xfrm>
-            <a:off x="4535640" y="4318942"/>
+            <a:off x="4532596" y="4201343"/>
             <a:ext cx="2405016" cy="2405016"/>
           </a:xfrm>
           <a:prstGeom prst="rect">
@@ -5745,7 +6163,7 @@
         </p:nvSpPr>
         <p:spPr>
           <a:xfrm>
-            <a:off x="6096000" y="1132114"/>
+            <a:off x="7620000" y="1132112"/>
             <a:ext cx="4572000" cy="1654629"/>
           </a:xfrm>
           <a:prstGeom prst="rect">
@@ -5977,7 +6395,7 @@
           <a:p>
             <a:r>
               <a:rPr lang="en-CA" dirty="0"/>
-              <a:t>Tests can overwrite: 4,5</a:t>
+              <a:t>Tests can overwrite: n/a</a:t>
             </a:r>
           </a:p>
         </p:txBody>
@@ -5997,7 +6415,7 @@
         <p:spPr>
           <a:xfrm>
             <a:off x="2119085" y="4801773"/>
-            <a:ext cx="3265715" cy="923330"/>
+            <a:ext cx="3265715" cy="646331"/>
           </a:xfrm>
           <a:prstGeom prst="rect">
             <a:avLst/>
@@ -6020,43 +6438,721 @@
               <a:rPr lang="en-CA" dirty="0"/>
               <a:t>-</a:t>
             </a:r>
-            <a:r>
-              <a:rPr lang="en-CA" dirty="0" err="1"/>
-              <a:t>Ea</a:t>
-            </a:r>
+          </a:p>
+        </p:txBody>
+      </p:sp>
+      <mc:AlternateContent xmlns:mc="http://schemas.openxmlformats.org/markup-compatibility/2006">
+        <mc:Choice xmlns:a14="http://schemas.microsoft.com/office/drawing/2010/main" Requires="a14">
+          <p:sp>
+            <p:nvSpPr>
+              <p:cNvPr id="6" name="TextBox 5">
+                <a:extLst>
+                  <a:ext uri="{FF2B5EF4-FFF2-40B4-BE49-F238E27FC236}">
+                    <a16:creationId xmlns:a16="http://schemas.microsoft.com/office/drawing/2014/main" id="{D6A07EAF-126E-49A1-8FC4-26F712A3656B}"/>
+                  </a:ext>
+                </a:extLst>
+              </p:cNvPr>
+              <p:cNvSpPr txBox="1"/>
+              <p:nvPr/>
+            </p:nvSpPr>
+            <p:spPr>
+              <a:xfrm>
+                <a:off x="3189154" y="1132112"/>
+                <a:ext cx="2765693" cy="276999"/>
+              </a:xfrm>
+              <a:prstGeom prst="rect">
+                <a:avLst/>
+              </a:prstGeom>
+              <a:noFill/>
+            </p:spPr>
+            <p:txBody>
+              <a:bodyPr wrap="none" lIns="0" tIns="0" rIns="0" bIns="0" rtlCol="0">
+                <a:spAutoFit/>
+              </a:bodyPr>
+              <a:lstStyle/>
+              <a:p>
+                <a14:m>
+                  <m:oMathPara xmlns:m="http://schemas.openxmlformats.org/officeDocument/2006/math">
+                    <m:oMathParaPr>
+                      <m:jc m:val="centerGroup"/>
+                    </m:oMathParaPr>
+                    <m:oMath xmlns:m="http://schemas.openxmlformats.org/officeDocument/2006/math">
+                      <m:r>
+                        <a:rPr lang="en-CA" b="0" i="1" smtClean="0">
+                          <a:latin typeface="Cambria Math" panose="02040503050406030204" pitchFamily="18" charset="0"/>
+                        </a:rPr>
+                        <m:t>𝑟h𝑜</m:t>
+                      </m:r>
+                      <m:r>
+                        <a:rPr lang="en-CA" b="0" i="1" smtClean="0">
+                          <a:latin typeface="Cambria Math" panose="02040503050406030204" pitchFamily="18" charset="0"/>
+                        </a:rPr>
+                        <m:t>=</m:t>
+                      </m:r>
+                      <m:r>
+                        <a:rPr lang="en-CA" b="0" i="1" smtClean="0">
+                          <a:latin typeface="Cambria Math" panose="02040503050406030204" pitchFamily="18" charset="0"/>
+                        </a:rPr>
+                        <m:t>𝜂</m:t>
+                      </m:r>
+                      <m:r>
+                        <a:rPr lang="en-CA" b="0" i="1" smtClean="0">
+                          <a:latin typeface="Cambria Math" panose="02040503050406030204" pitchFamily="18" charset="0"/>
+                        </a:rPr>
+                        <m:t>𝑟h</m:t>
+                      </m:r>
+                      <m:sSub>
+                        <m:sSubPr>
+                          <m:ctrlPr>
+                            <a:rPr lang="en-CA" b="0" i="1" smtClean="0">
+                              <a:latin typeface="Cambria Math" panose="02040503050406030204" pitchFamily="18" charset="0"/>
+                            </a:rPr>
+                          </m:ctrlPr>
+                        </m:sSubPr>
+                        <m:e>
+                          <m:r>
+                            <a:rPr lang="en-CA" b="0" i="1" smtClean="0">
+                              <a:latin typeface="Cambria Math" panose="02040503050406030204" pitchFamily="18" charset="0"/>
+                            </a:rPr>
+                            <m:t>𝑜</m:t>
+                          </m:r>
+                        </m:e>
+                        <m:sub>
+                          <m:r>
+                            <a:rPr lang="en-CA" b="0" i="1" smtClean="0">
+                              <a:latin typeface="Cambria Math" panose="02040503050406030204" pitchFamily="18" charset="0"/>
+                            </a:rPr>
+                            <m:t>1</m:t>
+                          </m:r>
+                        </m:sub>
+                      </m:sSub>
+                      <m:r>
+                        <a:rPr lang="en-CA" b="0" i="1" smtClean="0">
+                          <a:latin typeface="Cambria Math" panose="02040503050406030204" pitchFamily="18" charset="0"/>
+                        </a:rPr>
+                        <m:t>+</m:t>
+                      </m:r>
+                      <m:d>
+                        <m:dPr>
+                          <m:ctrlPr>
+                            <a:rPr lang="en-CA" b="0" i="1" smtClean="0">
+                              <a:latin typeface="Cambria Math" panose="02040503050406030204" pitchFamily="18" charset="0"/>
+                            </a:rPr>
+                          </m:ctrlPr>
+                        </m:dPr>
+                        <m:e>
+                          <m:r>
+                            <a:rPr lang="en-CA" b="0" i="1" smtClean="0">
+                              <a:latin typeface="Cambria Math" panose="02040503050406030204" pitchFamily="18" charset="0"/>
+                            </a:rPr>
+                            <m:t>1−</m:t>
+                          </m:r>
+                          <m:r>
+                            <a:rPr lang="en-CA" b="0" i="1" smtClean="0">
+                              <a:latin typeface="Cambria Math" panose="02040503050406030204" pitchFamily="18" charset="0"/>
+                            </a:rPr>
+                            <m:t>𝜂</m:t>
+                          </m:r>
+                        </m:e>
+                      </m:d>
+                      <m:r>
+                        <a:rPr lang="en-CA" b="0" i="1" smtClean="0">
+                          <a:latin typeface="Cambria Math" panose="02040503050406030204" pitchFamily="18" charset="0"/>
+                        </a:rPr>
+                        <m:t>𝑟h</m:t>
+                      </m:r>
+                      <m:sSub>
+                        <m:sSubPr>
+                          <m:ctrlPr>
+                            <a:rPr lang="en-CA" b="0" i="1" smtClean="0">
+                              <a:latin typeface="Cambria Math" panose="02040503050406030204" pitchFamily="18" charset="0"/>
+                            </a:rPr>
+                          </m:ctrlPr>
+                        </m:sSubPr>
+                        <m:e>
+                          <m:r>
+                            <a:rPr lang="en-CA" b="0" i="1" smtClean="0">
+                              <a:latin typeface="Cambria Math" panose="02040503050406030204" pitchFamily="18" charset="0"/>
+                            </a:rPr>
+                            <m:t>𝑜</m:t>
+                          </m:r>
+                        </m:e>
+                        <m:sub>
+                          <m:r>
+                            <a:rPr lang="en-CA" b="0" i="1" smtClean="0">
+                              <a:latin typeface="Cambria Math" panose="02040503050406030204" pitchFamily="18" charset="0"/>
+                            </a:rPr>
+                            <m:t>0</m:t>
+                          </m:r>
+                        </m:sub>
+                      </m:sSub>
+                    </m:oMath>
+                  </m:oMathPara>
+                </a14:m>
+                <a:endParaRPr lang="en-CA" dirty="0"/>
+              </a:p>
+            </p:txBody>
+          </p:sp>
+        </mc:Choice>
+        <mc:Fallback>
+          <p:sp>
+            <p:nvSpPr>
+              <p:cNvPr id="6" name="TextBox 5">
+                <a:extLst>
+                  <a:ext uri="{FF2B5EF4-FFF2-40B4-BE49-F238E27FC236}">
+                    <a16:creationId xmlns:a16="http://schemas.microsoft.com/office/drawing/2014/main" id="{D6A07EAF-126E-49A1-8FC4-26F712A3656B}"/>
+                  </a:ext>
+                </a:extLst>
+              </p:cNvPr>
+              <p:cNvSpPr txBox="1">
+                <a:spLocks noRot="1" noChangeAspect="1" noMove="1" noResize="1" noEditPoints="1" noAdjustHandles="1" noChangeArrowheads="1" noChangeShapeType="1" noTextEdit="1"/>
+              </p:cNvSpPr>
+              <p:nvPr/>
+            </p:nvSpPr>
+            <p:spPr>
+              <a:xfrm>
+                <a:off x="3189154" y="1132112"/>
+                <a:ext cx="2765693" cy="276999"/>
+              </a:xfrm>
+              <a:prstGeom prst="rect">
+                <a:avLst/>
+              </a:prstGeom>
+              <a:blipFill>
+                <a:blip r:embed="rId3"/>
+                <a:stretch>
+                  <a:fillRect l="-1762" t="-4444" r="-441" b="-35556"/>
+                </a:stretch>
+              </a:blipFill>
+            </p:spPr>
+            <p:txBody>
+              <a:bodyPr/>
+              <a:lstStyle/>
+              <a:p>
+                <a:r>
+                  <a:rPr lang="en-CA">
+                    <a:noFill/>
+                  </a:rPr>
+                  <a:t> </a:t>
+                </a:r>
+              </a:p>
+            </p:txBody>
+          </p:sp>
+        </mc:Fallback>
+      </mc:AlternateContent>
+      <mc:AlternateContent xmlns:mc="http://schemas.openxmlformats.org/markup-compatibility/2006">
+        <mc:Choice xmlns:a14="http://schemas.microsoft.com/office/drawing/2010/main" Requires="a14">
+          <p:sp>
+            <p:nvSpPr>
+              <p:cNvPr id="7" name="TextBox 6">
+                <a:extLst>
+                  <a:ext uri="{FF2B5EF4-FFF2-40B4-BE49-F238E27FC236}">
+                    <a16:creationId xmlns:a16="http://schemas.microsoft.com/office/drawing/2014/main" id="{3499A0DB-6927-44B7-927A-81C5819CBDC2}"/>
+                  </a:ext>
+                </a:extLst>
+              </p:cNvPr>
+              <p:cNvSpPr txBox="1"/>
+              <p:nvPr/>
+            </p:nvSpPr>
+            <p:spPr>
+              <a:xfrm>
+                <a:off x="3174708" y="1409111"/>
+                <a:ext cx="2210092" cy="676467"/>
+              </a:xfrm>
+              <a:prstGeom prst="rect">
+                <a:avLst/>
+              </a:prstGeom>
+              <a:noFill/>
+            </p:spPr>
+            <p:txBody>
+              <a:bodyPr wrap="none" lIns="0" tIns="0" rIns="0" bIns="0" rtlCol="0">
+                <a:spAutoFit/>
+              </a:bodyPr>
+              <a:lstStyle/>
+              <a:p>
+                <a14:m>
+                  <m:oMathPara xmlns:m="http://schemas.openxmlformats.org/officeDocument/2006/math">
+                    <m:oMathParaPr>
+                      <m:jc m:val="centerGroup"/>
+                    </m:oMathParaPr>
+                    <m:oMath xmlns:m="http://schemas.openxmlformats.org/officeDocument/2006/math">
+                      <m:r>
+                        <a:rPr lang="en-CA" b="0" i="1" smtClean="0">
+                          <a:latin typeface="Cambria Math" panose="02040503050406030204" pitchFamily="18" charset="0"/>
+                        </a:rPr>
+                        <m:t>𝑘</m:t>
+                      </m:r>
+                      <m:r>
+                        <a:rPr lang="en-CA" b="0" i="1" smtClean="0">
+                          <a:latin typeface="Cambria Math" panose="02040503050406030204" pitchFamily="18" charset="0"/>
+                        </a:rPr>
+                        <m:t>=</m:t>
+                      </m:r>
+                      <m:sSup>
+                        <m:sSupPr>
+                          <m:ctrlPr>
+                            <a:rPr lang="en-CA" b="0" i="1" smtClean="0">
+                              <a:latin typeface="Cambria Math" panose="02040503050406030204" pitchFamily="18" charset="0"/>
+                            </a:rPr>
+                          </m:ctrlPr>
+                        </m:sSupPr>
+                        <m:e>
+                          <m:d>
+                            <m:dPr>
+                              <m:ctrlPr>
+                                <a:rPr lang="en-CA" b="0" i="1" smtClean="0">
+                                  <a:latin typeface="Cambria Math" panose="02040503050406030204" pitchFamily="18" charset="0"/>
+                                </a:rPr>
+                              </m:ctrlPr>
+                            </m:dPr>
+                            <m:e>
+                              <m:f>
+                                <m:fPr>
+                                  <m:ctrlPr>
+                                    <a:rPr lang="en-CA" b="0" i="1" smtClean="0">
+                                      <a:latin typeface="Cambria Math" panose="02040503050406030204" pitchFamily="18" charset="0"/>
+                                    </a:rPr>
+                                  </m:ctrlPr>
+                                </m:fPr>
+                                <m:num>
+                                  <m:r>
+                                    <a:rPr lang="en-CA" b="0" i="1" smtClean="0">
+                                      <a:latin typeface="Cambria Math" panose="02040503050406030204" pitchFamily="18" charset="0"/>
+                                    </a:rPr>
+                                    <m:t>𝜂</m:t>
+                                  </m:r>
+                                </m:num>
+                                <m:den>
+                                  <m:sSub>
+                                    <m:sSubPr>
+                                      <m:ctrlPr>
+                                        <a:rPr lang="en-CA" b="0" i="1" smtClean="0">
+                                          <a:latin typeface="Cambria Math" panose="02040503050406030204" pitchFamily="18" charset="0"/>
+                                        </a:rPr>
+                                      </m:ctrlPr>
+                                    </m:sSubPr>
+                                    <m:e>
+                                      <m:r>
+                                        <a:rPr lang="en-CA" b="0" i="1" smtClean="0">
+                                          <a:latin typeface="Cambria Math" panose="02040503050406030204" pitchFamily="18" charset="0"/>
+                                        </a:rPr>
+                                        <m:t>𝑘</m:t>
+                                      </m:r>
+                                    </m:e>
+                                    <m:sub>
+                                      <m:r>
+                                        <a:rPr lang="en-CA" b="0" i="1" smtClean="0">
+                                          <a:latin typeface="Cambria Math" panose="02040503050406030204" pitchFamily="18" charset="0"/>
+                                        </a:rPr>
+                                        <m:t>1</m:t>
+                                      </m:r>
+                                    </m:sub>
+                                  </m:sSub>
+                                </m:den>
+                              </m:f>
+                              <m:r>
+                                <a:rPr lang="en-CA" b="0" i="1" smtClean="0">
+                                  <a:latin typeface="Cambria Math" panose="02040503050406030204" pitchFamily="18" charset="0"/>
+                                </a:rPr>
+                                <m:t>+</m:t>
+                              </m:r>
+                              <m:f>
+                                <m:fPr>
+                                  <m:ctrlPr>
+                                    <a:rPr lang="en-CA" b="0" i="1" smtClean="0">
+                                      <a:latin typeface="Cambria Math" panose="02040503050406030204" pitchFamily="18" charset="0"/>
+                                    </a:rPr>
+                                  </m:ctrlPr>
+                                </m:fPr>
+                                <m:num>
+                                  <m:d>
+                                    <m:dPr>
+                                      <m:ctrlPr>
+                                        <a:rPr lang="en-CA" b="0" i="1" smtClean="0">
+                                          <a:latin typeface="Cambria Math" panose="02040503050406030204" pitchFamily="18" charset="0"/>
+                                        </a:rPr>
+                                      </m:ctrlPr>
+                                    </m:dPr>
+                                    <m:e>
+                                      <m:r>
+                                        <a:rPr lang="en-CA" b="0" i="1" smtClean="0">
+                                          <a:latin typeface="Cambria Math" panose="02040503050406030204" pitchFamily="18" charset="0"/>
+                                        </a:rPr>
+                                        <m:t>1−</m:t>
+                                      </m:r>
+                                      <m:r>
+                                        <a:rPr lang="en-CA" b="0" i="1" smtClean="0">
+                                          <a:latin typeface="Cambria Math" panose="02040503050406030204" pitchFamily="18" charset="0"/>
+                                        </a:rPr>
+                                        <m:t>𝜂</m:t>
+                                      </m:r>
+                                    </m:e>
+                                  </m:d>
+                                </m:num>
+                                <m:den>
+                                  <m:sSub>
+                                    <m:sSubPr>
+                                      <m:ctrlPr>
+                                        <a:rPr lang="en-CA" b="0" i="1" smtClean="0">
+                                          <a:latin typeface="Cambria Math" panose="02040503050406030204" pitchFamily="18" charset="0"/>
+                                        </a:rPr>
+                                      </m:ctrlPr>
+                                    </m:sSubPr>
+                                    <m:e>
+                                      <m:r>
+                                        <a:rPr lang="en-CA" b="0" i="1" smtClean="0">
+                                          <a:latin typeface="Cambria Math" panose="02040503050406030204" pitchFamily="18" charset="0"/>
+                                        </a:rPr>
+                                        <m:t>𝑘</m:t>
+                                      </m:r>
+                                    </m:e>
+                                    <m:sub>
+                                      <m:r>
+                                        <a:rPr lang="en-CA" b="0" i="1" smtClean="0">
+                                          <a:latin typeface="Cambria Math" panose="02040503050406030204" pitchFamily="18" charset="0"/>
+                                        </a:rPr>
+                                        <m:t>0</m:t>
+                                      </m:r>
+                                    </m:sub>
+                                  </m:sSub>
+                                </m:den>
+                              </m:f>
+                            </m:e>
+                          </m:d>
+                        </m:e>
+                        <m:sup>
+                          <m:r>
+                            <a:rPr lang="en-CA" b="0" i="1" smtClean="0">
+                              <a:latin typeface="Cambria Math" panose="02040503050406030204" pitchFamily="18" charset="0"/>
+                            </a:rPr>
+                            <m:t>−1</m:t>
+                          </m:r>
+                        </m:sup>
+                      </m:sSup>
+                    </m:oMath>
+                  </m:oMathPara>
+                </a14:m>
+                <a:endParaRPr lang="en-CA" dirty="0"/>
+              </a:p>
+            </p:txBody>
+          </p:sp>
+        </mc:Choice>
+        <mc:Fallback>
+          <p:sp>
+            <p:nvSpPr>
+              <p:cNvPr id="7" name="TextBox 6">
+                <a:extLst>
+                  <a:ext uri="{FF2B5EF4-FFF2-40B4-BE49-F238E27FC236}">
+                    <a16:creationId xmlns:a16="http://schemas.microsoft.com/office/drawing/2014/main" id="{3499A0DB-6927-44B7-927A-81C5819CBDC2}"/>
+                  </a:ext>
+                </a:extLst>
+              </p:cNvPr>
+              <p:cNvSpPr txBox="1">
+                <a:spLocks noRot="1" noChangeAspect="1" noMove="1" noResize="1" noEditPoints="1" noAdjustHandles="1" noChangeArrowheads="1" noChangeShapeType="1" noTextEdit="1"/>
+              </p:cNvSpPr>
+              <p:nvPr/>
+            </p:nvSpPr>
+            <p:spPr>
+              <a:xfrm>
+                <a:off x="3174708" y="1409111"/>
+                <a:ext cx="2210092" cy="676467"/>
+              </a:xfrm>
+              <a:prstGeom prst="rect">
+                <a:avLst/>
+              </a:prstGeom>
+              <a:blipFill>
+                <a:blip r:embed="rId4"/>
+                <a:stretch>
+                  <a:fillRect/>
+                </a:stretch>
+              </a:blipFill>
+            </p:spPr>
+            <p:txBody>
+              <a:bodyPr/>
+              <a:lstStyle/>
+              <a:p>
+                <a:r>
+                  <a:rPr lang="en-CA">
+                    <a:noFill/>
+                  </a:rPr>
+                  <a:t> </a:t>
+                </a:r>
+              </a:p>
+            </p:txBody>
+          </p:sp>
+        </mc:Fallback>
+      </mc:AlternateContent>
+      <mc:AlternateContent xmlns:mc="http://schemas.openxmlformats.org/markup-compatibility/2006">
+        <mc:Choice xmlns:a14="http://schemas.microsoft.com/office/drawing/2010/main" Requires="a14">
+          <p:sp>
+            <p:nvSpPr>
+              <p:cNvPr id="8" name="TextBox 7">
+                <a:extLst>
+                  <a:ext uri="{FF2B5EF4-FFF2-40B4-BE49-F238E27FC236}">
+                    <a16:creationId xmlns:a16="http://schemas.microsoft.com/office/drawing/2014/main" id="{3B6F3C9A-1B0C-427B-828C-E13B95739CC8}"/>
+                  </a:ext>
+                </a:extLst>
+              </p:cNvPr>
+              <p:cNvSpPr txBox="1"/>
+              <p:nvPr/>
+            </p:nvSpPr>
+            <p:spPr>
+              <a:xfrm>
+                <a:off x="3189152" y="2139627"/>
+                <a:ext cx="2399311" cy="298415"/>
+              </a:xfrm>
+              <a:prstGeom prst="rect">
+                <a:avLst/>
+              </a:prstGeom>
+              <a:noFill/>
+            </p:spPr>
+            <p:txBody>
+              <a:bodyPr wrap="none" lIns="0" tIns="0" rIns="0" bIns="0" rtlCol="0">
+                <a:spAutoFit/>
+              </a:bodyPr>
+              <a:lstStyle/>
+              <a:p>
+                <a14:m>
+                  <m:oMathPara xmlns:m="http://schemas.openxmlformats.org/officeDocument/2006/math">
+                    <m:oMathParaPr>
+                      <m:jc m:val="centerGroup"/>
+                    </m:oMathParaPr>
+                    <m:oMath xmlns:m="http://schemas.openxmlformats.org/officeDocument/2006/math">
+                      <m:sSub>
+                        <m:sSubPr>
+                          <m:ctrlPr>
+                            <a:rPr lang="en-CA" b="0" i="1" smtClean="0">
+                              <a:latin typeface="Cambria Math" panose="02040503050406030204" pitchFamily="18" charset="0"/>
+                            </a:rPr>
+                          </m:ctrlPr>
+                        </m:sSubPr>
+                        <m:e>
+                          <m:r>
+                            <a:rPr lang="en-CA" b="0" i="1" smtClean="0">
+                              <a:latin typeface="Cambria Math" panose="02040503050406030204" pitchFamily="18" charset="0"/>
+                            </a:rPr>
+                            <m:t>𝐶</m:t>
+                          </m:r>
+                        </m:e>
+                        <m:sub>
+                          <m:r>
+                            <a:rPr lang="en-CA" b="0" i="1" smtClean="0">
+                              <a:latin typeface="Cambria Math" panose="02040503050406030204" pitchFamily="18" charset="0"/>
+                            </a:rPr>
+                            <m:t>𝑝</m:t>
+                          </m:r>
+                        </m:sub>
+                      </m:sSub>
+                      <m:r>
+                        <a:rPr lang="en-CA" b="0" i="1" smtClean="0">
+                          <a:latin typeface="Cambria Math" panose="02040503050406030204" pitchFamily="18" charset="0"/>
+                        </a:rPr>
+                        <m:t>=</m:t>
+                      </m:r>
+                      <m:r>
+                        <a:rPr lang="en-CA" b="0" i="1" smtClean="0">
+                          <a:latin typeface="Cambria Math" panose="02040503050406030204" pitchFamily="18" charset="0"/>
+                        </a:rPr>
+                        <m:t>𝜂</m:t>
+                      </m:r>
+                      <m:sSub>
+                        <m:sSubPr>
+                          <m:ctrlPr>
+                            <a:rPr lang="en-CA" i="1">
+                              <a:latin typeface="Cambria Math" panose="02040503050406030204" pitchFamily="18" charset="0"/>
+                            </a:rPr>
+                          </m:ctrlPr>
+                        </m:sSubPr>
+                        <m:e>
+                          <m:r>
+                            <a:rPr lang="en-CA" i="1">
+                              <a:latin typeface="Cambria Math" panose="02040503050406030204" pitchFamily="18" charset="0"/>
+                            </a:rPr>
+                            <m:t>𝐶</m:t>
+                          </m:r>
+                        </m:e>
+                        <m:sub>
+                          <m:r>
+                            <a:rPr lang="en-CA" i="1">
+                              <a:latin typeface="Cambria Math" panose="02040503050406030204" pitchFamily="18" charset="0"/>
+                            </a:rPr>
+                            <m:t>𝑝</m:t>
+                          </m:r>
+                          <m:r>
+                            <a:rPr lang="en-CA" b="0" i="1" smtClean="0">
+                              <a:latin typeface="Cambria Math" panose="02040503050406030204" pitchFamily="18" charset="0"/>
+                            </a:rPr>
+                            <m:t>1</m:t>
+                          </m:r>
+                        </m:sub>
+                      </m:sSub>
+                      <m:r>
+                        <a:rPr lang="en-CA" b="0" i="1" smtClean="0">
+                          <a:latin typeface="Cambria Math" panose="02040503050406030204" pitchFamily="18" charset="0"/>
+                        </a:rPr>
+                        <m:t>+</m:t>
+                      </m:r>
+                      <m:d>
+                        <m:dPr>
+                          <m:ctrlPr>
+                            <a:rPr lang="en-CA" b="0" i="1" smtClean="0">
+                              <a:latin typeface="Cambria Math" panose="02040503050406030204" pitchFamily="18" charset="0"/>
+                            </a:rPr>
+                          </m:ctrlPr>
+                        </m:dPr>
+                        <m:e>
+                          <m:r>
+                            <a:rPr lang="en-CA" b="0" i="1" smtClean="0">
+                              <a:latin typeface="Cambria Math" panose="02040503050406030204" pitchFamily="18" charset="0"/>
+                            </a:rPr>
+                            <m:t>1−</m:t>
+                          </m:r>
+                          <m:r>
+                            <a:rPr lang="en-CA" b="0" i="1" smtClean="0">
+                              <a:latin typeface="Cambria Math" panose="02040503050406030204" pitchFamily="18" charset="0"/>
+                            </a:rPr>
+                            <m:t>𝜂</m:t>
+                          </m:r>
+                        </m:e>
+                      </m:d>
+                      <m:sSub>
+                        <m:sSubPr>
+                          <m:ctrlPr>
+                            <a:rPr lang="en-CA" i="1">
+                              <a:latin typeface="Cambria Math" panose="02040503050406030204" pitchFamily="18" charset="0"/>
+                            </a:rPr>
+                          </m:ctrlPr>
+                        </m:sSubPr>
+                        <m:e>
+                          <m:r>
+                            <a:rPr lang="en-CA" i="1">
+                              <a:latin typeface="Cambria Math" panose="02040503050406030204" pitchFamily="18" charset="0"/>
+                            </a:rPr>
+                            <m:t>𝐶</m:t>
+                          </m:r>
+                        </m:e>
+                        <m:sub>
+                          <m:r>
+                            <a:rPr lang="en-CA" i="1">
+                              <a:latin typeface="Cambria Math" panose="02040503050406030204" pitchFamily="18" charset="0"/>
+                            </a:rPr>
+                            <m:t>𝑝</m:t>
+                          </m:r>
+                          <m:r>
+                            <a:rPr lang="en-CA" b="0" i="1" smtClean="0">
+                              <a:latin typeface="Cambria Math" panose="02040503050406030204" pitchFamily="18" charset="0"/>
+                            </a:rPr>
+                            <m:t>0</m:t>
+                          </m:r>
+                        </m:sub>
+                      </m:sSub>
+                    </m:oMath>
+                  </m:oMathPara>
+                </a14:m>
+                <a:endParaRPr lang="en-CA" dirty="0"/>
+              </a:p>
+            </p:txBody>
+          </p:sp>
+        </mc:Choice>
+        <mc:Fallback>
+          <p:sp>
+            <p:nvSpPr>
+              <p:cNvPr id="8" name="TextBox 7">
+                <a:extLst>
+                  <a:ext uri="{FF2B5EF4-FFF2-40B4-BE49-F238E27FC236}">
+                    <a16:creationId xmlns:a16="http://schemas.microsoft.com/office/drawing/2014/main" id="{3B6F3C9A-1B0C-427B-828C-E13B95739CC8}"/>
+                  </a:ext>
+                </a:extLst>
+              </p:cNvPr>
+              <p:cNvSpPr txBox="1">
+                <a:spLocks noRot="1" noChangeAspect="1" noMove="1" noResize="1" noEditPoints="1" noAdjustHandles="1" noChangeArrowheads="1" noChangeShapeType="1" noTextEdit="1"/>
+              </p:cNvSpPr>
+              <p:nvPr/>
+            </p:nvSpPr>
+            <p:spPr>
+              <a:xfrm>
+                <a:off x="3189152" y="2139627"/>
+                <a:ext cx="2399311" cy="298415"/>
+              </a:xfrm>
+              <a:prstGeom prst="rect">
+                <a:avLst/>
+              </a:prstGeom>
+              <a:blipFill>
+                <a:blip r:embed="rId5"/>
+                <a:stretch>
+                  <a:fillRect l="-1777" r="-761" b="-20408"/>
+                </a:stretch>
+              </a:blipFill>
+            </p:spPr>
+            <p:txBody>
+              <a:bodyPr/>
+              <a:lstStyle/>
+              <a:p>
+                <a:r>
+                  <a:rPr lang="en-CA">
+                    <a:noFill/>
+                  </a:rPr>
+                  <a:t> </a:t>
+                </a:r>
+              </a:p>
+            </p:txBody>
+          </p:sp>
+        </mc:Fallback>
+      </mc:AlternateContent>
+      <p:sp>
+        <p:nvSpPr>
+          <p:cNvPr id="9" name="TextBox 8">
+            <a:extLst>
+              <a:ext uri="{FF2B5EF4-FFF2-40B4-BE49-F238E27FC236}">
+                <a16:creationId xmlns:a16="http://schemas.microsoft.com/office/drawing/2014/main" id="{A1FE9227-93FC-4240-976F-AF8394711C0E}"/>
+              </a:ext>
+            </a:extLst>
+          </p:cNvPr>
+          <p:cNvSpPr txBox="1"/>
+          <p:nvPr/>
+        </p:nvSpPr>
+        <p:spPr>
+          <a:xfrm>
+            <a:off x="6902688" y="3429000"/>
+            <a:ext cx="4230533" cy="1477328"/>
+          </a:xfrm>
+          <a:prstGeom prst="rect">
+            <a:avLst/>
+          </a:prstGeom>
+          <a:noFill/>
+        </p:spPr>
+        <p:txBody>
+          <a:bodyPr wrap="square" rtlCol="0">
+            <a:spAutoFit/>
+          </a:bodyPr>
+          <a:lstStyle/>
+          <a:p>
+            <a:r>
+              <a:rPr lang="en-CA" b="1" dirty="0"/>
+              <a:t>Parameters tested:</a:t>
+            </a:r>
+          </a:p>
+          <a:p>
             <a:r>
               <a:rPr lang="en-CA" dirty="0"/>
-              <a:t>=4000, A0=1e6, </a:t>
-            </a:r>
-            <a:r>
-              <a:rPr lang="en-CA" dirty="0" err="1"/>
-              <a:t>dH</a:t>
-            </a:r>
+              <a:t>-Flux BC</a:t>
+            </a:r>
+          </a:p>
+          <a:p>
             <a:r>
               <a:rPr lang="en-CA" dirty="0"/>
-              <a:t>=300000</a:t>
+              <a:t>-Arrhenius parameters</a:t>
             </a:r>
           </a:p>
           <a:p>
             <a:r>
               <a:rPr lang="en-CA" dirty="0"/>
-              <a:t>-</a:t>
-            </a:r>
-            <a:r>
-              <a:rPr lang="en-CA" dirty="0" err="1"/>
-              <a:t>Ea</a:t>
-            </a:r>
+              <a:t>-Enthalpy of combustion</a:t>
+            </a:r>
+          </a:p>
+          <a:p>
             <a:r>
               <a:rPr lang="en-CA" dirty="0"/>
-              <a:t>=4000, A0=1e8, </a:t>
-            </a:r>
-            <a:r>
-              <a:rPr lang="en-CA" dirty="0" err="1"/>
-              <a:t>dH</a:t>
-            </a:r>
-            <a:r>
-              <a:rPr lang="en-CA" dirty="0"/>
-              <a:t>=300000</a:t>
+              <a:t>-Ignition temperature (flux BC removed)</a:t>
             </a:r>
           </a:p>
         </p:txBody>
@@ -6065,6 +7161,2638 @@
     <p:extLst>
       <p:ext uri="{BB962C8B-B14F-4D97-AF65-F5344CB8AC3E}">
         <p14:creationId xmlns:p14="http://schemas.microsoft.com/office/powerpoint/2010/main" val="2294517389"/>
+      </p:ext>
+    </p:extLst>
+  </p:cSld>
+  <p:clrMapOvr>
+    <a:masterClrMapping/>
+  </p:clrMapOvr>
+</p:sld>
+</file>
+
+<file path=ppt/slides/slide6.xml><?xml version="1.0" encoding="utf-8"?>
+<p:sld xmlns:a="http://schemas.openxmlformats.org/drawingml/2006/main" xmlns:r="http://schemas.openxmlformats.org/officeDocument/2006/relationships" xmlns:p="http://schemas.openxmlformats.org/presentationml/2006/main">
+  <p:cSld>
+    <p:spTree>
+      <p:nvGrpSpPr>
+        <p:cNvPr id="1" name=""/>
+        <p:cNvGrpSpPr/>
+        <p:nvPr/>
+      </p:nvGrpSpPr>
+      <p:grpSpPr>
+        <a:xfrm>
+          <a:off x="0" y="0"/>
+          <a:ext cx="0" cy="0"/>
+          <a:chOff x="0" y="0"/>
+          <a:chExt cx="0" cy="0"/>
+        </a:xfrm>
+      </p:grpSpPr>
+      <p:sp>
+        <p:nvSpPr>
+          <p:cNvPr id="9" name="TextBox 8">
+            <a:extLst>
+              <a:ext uri="{FF2B5EF4-FFF2-40B4-BE49-F238E27FC236}">
+                <a16:creationId xmlns:a16="http://schemas.microsoft.com/office/drawing/2014/main" id="{41A3C277-5DAA-4D2F-A5CA-FC7C758FC832}"/>
+              </a:ext>
+            </a:extLst>
+          </p:cNvPr>
+          <p:cNvSpPr txBox="1"/>
+          <p:nvPr/>
+        </p:nvSpPr>
+        <p:spPr>
+          <a:xfrm>
+            <a:off x="377505" y="233318"/>
+            <a:ext cx="2522536" cy="369332"/>
+          </a:xfrm>
+          <a:prstGeom prst="rect">
+            <a:avLst/>
+          </a:prstGeom>
+          <a:noFill/>
+        </p:spPr>
+        <p:txBody>
+          <a:bodyPr wrap="square" rtlCol="0">
+            <a:spAutoFit/>
+          </a:bodyPr>
+          <a:lstStyle/>
+          <a:p>
+            <a:r>
+              <a:rPr lang="en-CA" b="1" dirty="0"/>
+              <a:t>Flux BC investigations</a:t>
+            </a:r>
+          </a:p>
+        </p:txBody>
+      </p:sp>
+      <p:sp>
+        <p:nvSpPr>
+          <p:cNvPr id="14" name="TextBox 13">
+            <a:extLst>
+              <a:ext uri="{FF2B5EF4-FFF2-40B4-BE49-F238E27FC236}">
+                <a16:creationId xmlns:a16="http://schemas.microsoft.com/office/drawing/2014/main" id="{E3279457-A7C5-4C63-9E4D-93D391564F8C}"/>
+              </a:ext>
+            </a:extLst>
+          </p:cNvPr>
+          <p:cNvSpPr txBox="1"/>
+          <p:nvPr/>
+        </p:nvSpPr>
+        <p:spPr>
+          <a:xfrm>
+            <a:off x="3185476" y="233318"/>
+            <a:ext cx="8332756" cy="369332"/>
+          </a:xfrm>
+          <a:prstGeom prst="rect">
+            <a:avLst/>
+          </a:prstGeom>
+          <a:noFill/>
+        </p:spPr>
+        <p:txBody>
+          <a:bodyPr wrap="square" rtlCol="0">
+            <a:spAutoFit/>
+          </a:bodyPr>
+          <a:lstStyle/>
+          <a:p>
+            <a:r>
+              <a:rPr lang="en-CA" dirty="0"/>
+              <a:t>A0=4.89e6, </a:t>
+            </a:r>
+            <a:r>
+              <a:rPr lang="en-CA" dirty="0" err="1"/>
+              <a:t>dH</a:t>
+            </a:r>
+            <a:r>
+              <a:rPr lang="en-CA" dirty="0"/>
+              <a:t>=63 kJ/cm^3, </a:t>
+            </a:r>
+            <a:r>
+              <a:rPr lang="en-CA" dirty="0" err="1"/>
+              <a:t>T_ign</a:t>
+            </a:r>
+            <a:r>
+              <a:rPr lang="en-CA" dirty="0"/>
+              <a:t>=1200 K,  </a:t>
+            </a:r>
+          </a:p>
+        </p:txBody>
+      </p:sp>
+      <p:graphicFrame>
+        <p:nvGraphicFramePr>
+          <p:cNvPr id="6" name="Table 5">
+            <a:extLst>
+              <a:ext uri="{FF2B5EF4-FFF2-40B4-BE49-F238E27FC236}">
+                <a16:creationId xmlns:a16="http://schemas.microsoft.com/office/drawing/2014/main" id="{263F9B4A-A05C-4F29-AC5B-772A0929E7FC}"/>
+              </a:ext>
+            </a:extLst>
+          </p:cNvPr>
+          <p:cNvGraphicFramePr>
+            <a:graphicFrameLocks noGrp="1"/>
+          </p:cNvGraphicFramePr>
+          <p:nvPr>
+            <p:extLst>
+              <p:ext uri="{D42A27DB-BD31-4B8C-83A1-F6EECF244321}">
+                <p14:modId xmlns:p14="http://schemas.microsoft.com/office/powerpoint/2010/main" val="110501425"/>
+              </p:ext>
+            </p:extLst>
+          </p:nvPr>
+        </p:nvGraphicFramePr>
+        <p:xfrm>
+          <a:off x="2032000" y="1031240"/>
+          <a:ext cx="8128000" cy="2397760"/>
+        </p:xfrm>
+        <a:graphic>
+          <a:graphicData uri="http://schemas.openxmlformats.org/drawingml/2006/table">
+            <a:tbl>
+              <a:tblPr firstRow="1" bandRow="1">
+                <a:tableStyleId>{5C22544A-7EE6-4342-B048-85BDC9FD1C3A}</a:tableStyleId>
+              </a:tblPr>
+              <a:tblGrid>
+                <a:gridCol w="1625600">
+                  <a:extLst>
+                    <a:ext uri="{9D8B030D-6E8A-4147-A177-3AD203B41FA5}">
+                      <a16:colId xmlns:a16="http://schemas.microsoft.com/office/drawing/2014/main" val="255438585"/>
+                    </a:ext>
+                  </a:extLst>
+                </a:gridCol>
+                <a:gridCol w="1625600">
+                  <a:extLst>
+                    <a:ext uri="{9D8B030D-6E8A-4147-A177-3AD203B41FA5}">
+                      <a16:colId xmlns:a16="http://schemas.microsoft.com/office/drawing/2014/main" val="2572141942"/>
+                    </a:ext>
+                  </a:extLst>
+                </a:gridCol>
+                <a:gridCol w="1625600">
+                  <a:extLst>
+                    <a:ext uri="{9D8B030D-6E8A-4147-A177-3AD203B41FA5}">
+                      <a16:colId xmlns:a16="http://schemas.microsoft.com/office/drawing/2014/main" val="1257599333"/>
+                    </a:ext>
+                  </a:extLst>
+                </a:gridCol>
+                <a:gridCol w="1625600">
+                  <a:extLst>
+                    <a:ext uri="{9D8B030D-6E8A-4147-A177-3AD203B41FA5}">
+                      <a16:colId xmlns:a16="http://schemas.microsoft.com/office/drawing/2014/main" val="2090226413"/>
+                    </a:ext>
+                  </a:extLst>
+                </a:gridCol>
+                <a:gridCol w="1625600">
+                  <a:extLst>
+                    <a:ext uri="{9D8B030D-6E8A-4147-A177-3AD203B41FA5}">
+                      <a16:colId xmlns:a16="http://schemas.microsoft.com/office/drawing/2014/main" val="493585771"/>
+                    </a:ext>
+                  </a:extLst>
+                </a:gridCol>
+              </a:tblGrid>
+              <a:tr h="370840">
+                <a:tc>
+                  <a:txBody>
+                    <a:bodyPr/>
+                    <a:lstStyle/>
+                    <a:p>
+                      <a:r>
+                        <a:rPr lang="en-CA" dirty="0"/>
+                        <a:t>Flux (MW/m^2)</a:t>
+                      </a:r>
+                    </a:p>
+                  </a:txBody>
+                  <a:tcPr/>
+                </a:tc>
+                <a:tc>
+                  <a:txBody>
+                    <a:bodyPr/>
+                    <a:lstStyle/>
+                    <a:p>
+                      <a:r>
+                        <a:rPr lang="en-CA" dirty="0" err="1"/>
+                        <a:t>Ea</a:t>
+                      </a:r>
+                      <a:r>
+                        <a:rPr lang="en-CA" dirty="0"/>
+                        <a:t> (kJ/</a:t>
+                      </a:r>
+                      <a:r>
+                        <a:rPr lang="en-CA" dirty="0" err="1"/>
+                        <a:t>mol</a:t>
+                      </a:r>
+                      <a:r>
+                        <a:rPr lang="en-CA" dirty="0"/>
+                        <a:t>)</a:t>
+                      </a:r>
+                    </a:p>
+                  </a:txBody>
+                  <a:tcPr/>
+                </a:tc>
+                <a:tc>
+                  <a:txBody>
+                    <a:bodyPr/>
+                    <a:lstStyle/>
+                    <a:p>
+                      <a:r>
+                        <a:rPr lang="en-CA" dirty="0"/>
+                        <a:t>Ignition delay (</a:t>
+                      </a:r>
+                      <a:r>
+                        <a:rPr lang="en-CA" dirty="0" err="1"/>
+                        <a:t>ms</a:t>
+                      </a:r>
+                      <a:r>
+                        <a:rPr lang="en-CA" dirty="0"/>
+                        <a:t>)</a:t>
+                      </a:r>
+                    </a:p>
+                  </a:txBody>
+                  <a:tcPr/>
+                </a:tc>
+                <a:tc>
+                  <a:txBody>
+                    <a:bodyPr/>
+                    <a:lstStyle/>
+                    <a:p>
+                      <a:r>
+                        <a:rPr lang="en-CA" dirty="0"/>
+                        <a:t>Flame front speed (m/s)</a:t>
+                      </a:r>
+                    </a:p>
+                  </a:txBody>
+                  <a:tcPr/>
+                </a:tc>
+                <a:tc>
+                  <a:txBody>
+                    <a:bodyPr/>
+                    <a:lstStyle/>
+                    <a:p>
+                      <a:r>
+                        <a:rPr lang="en-CA" dirty="0"/>
+                        <a:t>OOM Temperature (K)</a:t>
+                      </a:r>
+                    </a:p>
+                  </a:txBody>
+                  <a:tcPr/>
+                </a:tc>
+                <a:extLst>
+                  <a:ext uri="{0D108BD9-81ED-4DB2-BD59-A6C34878D82A}">
+                    <a16:rowId xmlns:a16="http://schemas.microsoft.com/office/drawing/2014/main" val="1635529842"/>
+                  </a:ext>
+                </a:extLst>
+              </a:tr>
+              <a:tr h="370840">
+                <a:tc>
+                  <a:txBody>
+                    <a:bodyPr/>
+                    <a:lstStyle/>
+                    <a:p>
+                      <a:r>
+                        <a:rPr lang="en-CA" dirty="0"/>
+                        <a:t>200</a:t>
+                      </a:r>
+                    </a:p>
+                  </a:txBody>
+                  <a:tcPr/>
+                </a:tc>
+                <a:tc>
+                  <a:txBody>
+                    <a:bodyPr/>
+                    <a:lstStyle/>
+                    <a:p>
+                      <a:r>
+                        <a:rPr lang="en-CA" dirty="0"/>
+                        <a:t>48</a:t>
+                      </a:r>
+                    </a:p>
+                  </a:txBody>
+                  <a:tcPr/>
+                </a:tc>
+                <a:tc>
+                  <a:txBody>
+                    <a:bodyPr/>
+                    <a:lstStyle/>
+                    <a:p>
+                      <a:r>
+                        <a:rPr lang="en-CA" dirty="0"/>
+                        <a:t>0.15</a:t>
+                      </a:r>
+                    </a:p>
+                  </a:txBody>
+                  <a:tcPr/>
+                </a:tc>
+                <a:tc>
+                  <a:txBody>
+                    <a:bodyPr/>
+                    <a:lstStyle/>
+                    <a:p>
+                      <a:r>
+                        <a:rPr lang="en-CA" dirty="0"/>
+                        <a:t>9.2</a:t>
+                      </a:r>
+                    </a:p>
+                  </a:txBody>
+                  <a:tcPr/>
+                </a:tc>
+                <a:tc>
+                  <a:txBody>
+                    <a:bodyPr/>
+                    <a:lstStyle/>
+                    <a:p>
+                      <a:r>
+                        <a:rPr lang="en-CA" dirty="0"/>
+                        <a:t>20000</a:t>
+                      </a:r>
+                    </a:p>
+                  </a:txBody>
+                  <a:tcPr/>
+                </a:tc>
+                <a:extLst>
+                  <a:ext uri="{0D108BD9-81ED-4DB2-BD59-A6C34878D82A}">
+                    <a16:rowId xmlns:a16="http://schemas.microsoft.com/office/drawing/2014/main" val="2864532243"/>
+                  </a:ext>
+                </a:extLst>
+              </a:tr>
+              <a:tr h="370840">
+                <a:tc>
+                  <a:txBody>
+                    <a:bodyPr/>
+                    <a:lstStyle/>
+                    <a:p>
+                      <a:r>
+                        <a:rPr lang="en-CA" dirty="0"/>
+                        <a:t>400</a:t>
+                      </a:r>
+                    </a:p>
+                  </a:txBody>
+                  <a:tcPr/>
+                </a:tc>
+                <a:tc>
+                  <a:txBody>
+                    <a:bodyPr/>
+                    <a:lstStyle/>
+                    <a:p>
+                      <a:r>
+                        <a:rPr lang="en-CA" dirty="0"/>
+                        <a:t>48</a:t>
+                      </a:r>
+                    </a:p>
+                  </a:txBody>
+                  <a:tcPr/>
+                </a:tc>
+                <a:tc>
+                  <a:txBody>
+                    <a:bodyPr/>
+                    <a:lstStyle/>
+                    <a:p>
+                      <a:endParaRPr lang="en-CA" dirty="0"/>
+                    </a:p>
+                  </a:txBody>
+                  <a:tcPr/>
+                </a:tc>
+                <a:tc>
+                  <a:txBody>
+                    <a:bodyPr/>
+                    <a:lstStyle/>
+                    <a:p>
+                      <a:endParaRPr lang="en-CA" dirty="0"/>
+                    </a:p>
+                  </a:txBody>
+                  <a:tcPr/>
+                </a:tc>
+                <a:tc>
+                  <a:txBody>
+                    <a:bodyPr/>
+                    <a:lstStyle/>
+                    <a:p>
+                      <a:endParaRPr lang="en-CA" dirty="0"/>
+                    </a:p>
+                  </a:txBody>
+                  <a:tcPr/>
+                </a:tc>
+                <a:extLst>
+                  <a:ext uri="{0D108BD9-81ED-4DB2-BD59-A6C34878D82A}">
+                    <a16:rowId xmlns:a16="http://schemas.microsoft.com/office/drawing/2014/main" val="3852607871"/>
+                  </a:ext>
+                </a:extLst>
+              </a:tr>
+              <a:tr h="370840">
+                <a:tc>
+                  <a:txBody>
+                    <a:bodyPr/>
+                    <a:lstStyle/>
+                    <a:p>
+                      <a:r>
+                        <a:rPr lang="en-CA" dirty="0"/>
+                        <a:t>200</a:t>
+                      </a:r>
+                    </a:p>
+                  </a:txBody>
+                  <a:tcPr/>
+                </a:tc>
+                <a:tc>
+                  <a:txBody>
+                    <a:bodyPr/>
+                    <a:lstStyle/>
+                    <a:p>
+                      <a:r>
+                        <a:rPr lang="en-CA" dirty="0"/>
+                        <a:t>70</a:t>
+                      </a:r>
+                    </a:p>
+                  </a:txBody>
+                  <a:tcPr/>
+                </a:tc>
+                <a:tc>
+                  <a:txBody>
+                    <a:bodyPr/>
+                    <a:lstStyle/>
+                    <a:p>
+                      <a:r>
+                        <a:rPr lang="en-CA" dirty="0"/>
+                        <a:t>0.54</a:t>
+                      </a:r>
+                    </a:p>
+                  </a:txBody>
+                  <a:tcPr/>
+                </a:tc>
+                <a:tc>
+                  <a:txBody>
+                    <a:bodyPr/>
+                    <a:lstStyle/>
+                    <a:p>
+                      <a:r>
+                        <a:rPr lang="en-CA" dirty="0"/>
+                        <a:t>7.0</a:t>
+                      </a:r>
+                    </a:p>
+                  </a:txBody>
+                  <a:tcPr/>
+                </a:tc>
+                <a:tc>
+                  <a:txBody>
+                    <a:bodyPr/>
+                    <a:lstStyle/>
+                    <a:p>
+                      <a:r>
+                        <a:rPr lang="en-CA" dirty="0"/>
+                        <a:t>20000</a:t>
+                      </a:r>
+                    </a:p>
+                  </a:txBody>
+                  <a:tcPr/>
+                </a:tc>
+                <a:extLst>
+                  <a:ext uri="{0D108BD9-81ED-4DB2-BD59-A6C34878D82A}">
+                    <a16:rowId xmlns:a16="http://schemas.microsoft.com/office/drawing/2014/main" val="1519851890"/>
+                  </a:ext>
+                </a:extLst>
+              </a:tr>
+              <a:tr h="370840">
+                <a:tc>
+                  <a:txBody>
+                    <a:bodyPr/>
+                    <a:lstStyle/>
+                    <a:p>
+                      <a:r>
+                        <a:rPr lang="en-CA" dirty="0"/>
+                        <a:t>400</a:t>
+                      </a:r>
+                    </a:p>
+                  </a:txBody>
+                  <a:tcPr/>
+                </a:tc>
+                <a:tc>
+                  <a:txBody>
+                    <a:bodyPr/>
+                    <a:lstStyle/>
+                    <a:p>
+                      <a:r>
+                        <a:rPr lang="en-CA" dirty="0"/>
+                        <a:t>70</a:t>
+                      </a:r>
+                    </a:p>
+                  </a:txBody>
+                  <a:tcPr/>
+                </a:tc>
+                <a:tc>
+                  <a:txBody>
+                    <a:bodyPr/>
+                    <a:lstStyle/>
+                    <a:p>
+                      <a:endParaRPr lang="en-CA" dirty="0"/>
+                    </a:p>
+                  </a:txBody>
+                  <a:tcPr/>
+                </a:tc>
+                <a:tc>
+                  <a:txBody>
+                    <a:bodyPr/>
+                    <a:lstStyle/>
+                    <a:p>
+                      <a:endParaRPr lang="en-CA" dirty="0"/>
+                    </a:p>
+                  </a:txBody>
+                  <a:tcPr/>
+                </a:tc>
+                <a:tc>
+                  <a:txBody>
+                    <a:bodyPr/>
+                    <a:lstStyle/>
+                    <a:p>
+                      <a:endParaRPr lang="en-CA" dirty="0"/>
+                    </a:p>
+                  </a:txBody>
+                  <a:tcPr/>
+                </a:tc>
+                <a:extLst>
+                  <a:ext uri="{0D108BD9-81ED-4DB2-BD59-A6C34878D82A}">
+                    <a16:rowId xmlns:a16="http://schemas.microsoft.com/office/drawing/2014/main" val="1761035812"/>
+                  </a:ext>
+                </a:extLst>
+              </a:tr>
+            </a:tbl>
+          </a:graphicData>
+        </a:graphic>
+      </p:graphicFrame>
+      <p:sp>
+        <p:nvSpPr>
+          <p:cNvPr id="2" name="TextBox 1">
+            <a:extLst>
+              <a:ext uri="{FF2B5EF4-FFF2-40B4-BE49-F238E27FC236}">
+                <a16:creationId xmlns:a16="http://schemas.microsoft.com/office/drawing/2014/main" id="{4EFBB176-4730-4F73-BAA3-AB2FCB461661}"/>
+              </a:ext>
+            </a:extLst>
+          </p:cNvPr>
+          <p:cNvSpPr txBox="1"/>
+          <p:nvPr/>
+        </p:nvSpPr>
+        <p:spPr>
+          <a:xfrm>
+            <a:off x="0" y="1860788"/>
+            <a:ext cx="1638773" cy="369332"/>
+          </a:xfrm>
+          <a:prstGeom prst="rect">
+            <a:avLst/>
+          </a:prstGeom>
+          <a:noFill/>
+        </p:spPr>
+        <p:txBody>
+          <a:bodyPr wrap="square" rtlCol="0">
+            <a:spAutoFit/>
+          </a:bodyPr>
+          <a:lstStyle/>
+          <a:p>
+            <a:r>
+              <a:rPr lang="en-CA" dirty="0"/>
+              <a:t>Flux-1</a:t>
+            </a:r>
+          </a:p>
+        </p:txBody>
+      </p:sp>
+      <p:sp>
+        <p:nvSpPr>
+          <p:cNvPr id="7" name="TextBox 6">
+            <a:extLst>
+              <a:ext uri="{FF2B5EF4-FFF2-40B4-BE49-F238E27FC236}">
+                <a16:creationId xmlns:a16="http://schemas.microsoft.com/office/drawing/2014/main" id="{7BC08884-B347-437A-8B02-295A28AD5503}"/>
+              </a:ext>
+            </a:extLst>
+          </p:cNvPr>
+          <p:cNvSpPr txBox="1"/>
+          <p:nvPr/>
+        </p:nvSpPr>
+        <p:spPr>
+          <a:xfrm>
+            <a:off x="-1" y="2690336"/>
+            <a:ext cx="1638773" cy="369332"/>
+          </a:xfrm>
+          <a:prstGeom prst="rect">
+            <a:avLst/>
+          </a:prstGeom>
+          <a:noFill/>
+        </p:spPr>
+        <p:txBody>
+          <a:bodyPr wrap="square" rtlCol="0">
+            <a:spAutoFit/>
+          </a:bodyPr>
+          <a:lstStyle/>
+          <a:p>
+            <a:r>
+              <a:rPr lang="en-CA" dirty="0"/>
+              <a:t>Flux-2</a:t>
+            </a:r>
+          </a:p>
+        </p:txBody>
+      </p:sp>
+    </p:spTree>
+    <p:extLst>
+      <p:ext uri="{BB962C8B-B14F-4D97-AF65-F5344CB8AC3E}">
+        <p14:creationId xmlns:p14="http://schemas.microsoft.com/office/powerpoint/2010/main" val="2660376848"/>
+      </p:ext>
+    </p:extLst>
+  </p:cSld>
+  <p:clrMapOvr>
+    <a:masterClrMapping/>
+  </p:clrMapOvr>
+</p:sld>
+</file>
+
+<file path=ppt/slides/slide7.xml><?xml version="1.0" encoding="utf-8"?>
+<p:sld xmlns:a="http://schemas.openxmlformats.org/drawingml/2006/main" xmlns:r="http://schemas.openxmlformats.org/officeDocument/2006/relationships" xmlns:p="http://schemas.openxmlformats.org/presentationml/2006/main">
+  <p:cSld>
+    <p:spTree>
+      <p:nvGrpSpPr>
+        <p:cNvPr id="1" name=""/>
+        <p:cNvGrpSpPr/>
+        <p:nvPr/>
+      </p:nvGrpSpPr>
+      <p:grpSpPr>
+        <a:xfrm>
+          <a:off x="0" y="0"/>
+          <a:ext cx="0" cy="0"/>
+          <a:chOff x="0" y="0"/>
+          <a:chExt cx="0" cy="0"/>
+        </a:xfrm>
+      </p:grpSpPr>
+      <p:sp>
+        <p:nvSpPr>
+          <p:cNvPr id="9" name="TextBox 8">
+            <a:extLst>
+              <a:ext uri="{FF2B5EF4-FFF2-40B4-BE49-F238E27FC236}">
+                <a16:creationId xmlns:a16="http://schemas.microsoft.com/office/drawing/2014/main" id="{41A3C277-5DAA-4D2F-A5CA-FC7C758FC832}"/>
+              </a:ext>
+            </a:extLst>
+          </p:cNvPr>
+          <p:cNvSpPr txBox="1"/>
+          <p:nvPr/>
+        </p:nvSpPr>
+        <p:spPr>
+          <a:xfrm>
+            <a:off x="377504" y="233318"/>
+            <a:ext cx="2807971" cy="646331"/>
+          </a:xfrm>
+          <a:prstGeom prst="rect">
+            <a:avLst/>
+          </a:prstGeom>
+          <a:noFill/>
+        </p:spPr>
+        <p:txBody>
+          <a:bodyPr wrap="square" rtlCol="0">
+            <a:spAutoFit/>
+          </a:bodyPr>
+          <a:lstStyle/>
+          <a:p>
+            <a:r>
+              <a:rPr lang="en-CA" b="1" dirty="0"/>
+              <a:t>Ignition temperature investigations</a:t>
+            </a:r>
+          </a:p>
+        </p:txBody>
+      </p:sp>
+      <p:sp>
+        <p:nvSpPr>
+          <p:cNvPr id="14" name="TextBox 13">
+            <a:extLst>
+              <a:ext uri="{FF2B5EF4-FFF2-40B4-BE49-F238E27FC236}">
+                <a16:creationId xmlns:a16="http://schemas.microsoft.com/office/drawing/2014/main" id="{E3279457-A7C5-4C63-9E4D-93D391564F8C}"/>
+              </a:ext>
+            </a:extLst>
+          </p:cNvPr>
+          <p:cNvSpPr txBox="1"/>
+          <p:nvPr/>
+        </p:nvSpPr>
+        <p:spPr>
+          <a:xfrm>
+            <a:off x="3185476" y="233318"/>
+            <a:ext cx="8332756" cy="369332"/>
+          </a:xfrm>
+          <a:prstGeom prst="rect">
+            <a:avLst/>
+          </a:prstGeom>
+          <a:noFill/>
+        </p:spPr>
+        <p:txBody>
+          <a:bodyPr wrap="square" rtlCol="0">
+            <a:spAutoFit/>
+          </a:bodyPr>
+          <a:lstStyle/>
+          <a:p>
+            <a:r>
+              <a:rPr lang="en-CA" dirty="0"/>
+              <a:t>A0=4.89e6, </a:t>
+            </a:r>
+            <a:r>
+              <a:rPr lang="en-CA" dirty="0" err="1"/>
+              <a:t>dH</a:t>
+            </a:r>
+            <a:r>
+              <a:rPr lang="en-CA" dirty="0"/>
+              <a:t>=63 kJ/cm^3, Flux=400 MW/m^2  </a:t>
+            </a:r>
+          </a:p>
+        </p:txBody>
+      </p:sp>
+      <p:graphicFrame>
+        <p:nvGraphicFramePr>
+          <p:cNvPr id="6" name="Table 5">
+            <a:extLst>
+              <a:ext uri="{FF2B5EF4-FFF2-40B4-BE49-F238E27FC236}">
+                <a16:creationId xmlns:a16="http://schemas.microsoft.com/office/drawing/2014/main" id="{263F9B4A-A05C-4F29-AC5B-772A0929E7FC}"/>
+              </a:ext>
+            </a:extLst>
+          </p:cNvPr>
+          <p:cNvGraphicFramePr>
+            <a:graphicFrameLocks noGrp="1"/>
+          </p:cNvGraphicFramePr>
+          <p:nvPr>
+            <p:extLst>
+              <p:ext uri="{D42A27DB-BD31-4B8C-83A1-F6EECF244321}">
+                <p14:modId xmlns:p14="http://schemas.microsoft.com/office/powerpoint/2010/main" val="3358571379"/>
+              </p:ext>
+            </p:extLst>
+          </p:nvPr>
+        </p:nvGraphicFramePr>
+        <p:xfrm>
+          <a:off x="2032000" y="879649"/>
+          <a:ext cx="8128000" cy="4251960"/>
+        </p:xfrm>
+        <a:graphic>
+          <a:graphicData uri="http://schemas.openxmlformats.org/drawingml/2006/table">
+            <a:tbl>
+              <a:tblPr firstRow="1" bandRow="1">
+                <a:tableStyleId>{5C22544A-7EE6-4342-B048-85BDC9FD1C3A}</a:tableStyleId>
+              </a:tblPr>
+              <a:tblGrid>
+                <a:gridCol w="1625600">
+                  <a:extLst>
+                    <a:ext uri="{9D8B030D-6E8A-4147-A177-3AD203B41FA5}">
+                      <a16:colId xmlns:a16="http://schemas.microsoft.com/office/drawing/2014/main" val="255438585"/>
+                    </a:ext>
+                  </a:extLst>
+                </a:gridCol>
+                <a:gridCol w="1625600">
+                  <a:extLst>
+                    <a:ext uri="{9D8B030D-6E8A-4147-A177-3AD203B41FA5}">
+                      <a16:colId xmlns:a16="http://schemas.microsoft.com/office/drawing/2014/main" val="2572141942"/>
+                    </a:ext>
+                  </a:extLst>
+                </a:gridCol>
+                <a:gridCol w="1625600">
+                  <a:extLst>
+                    <a:ext uri="{9D8B030D-6E8A-4147-A177-3AD203B41FA5}">
+                      <a16:colId xmlns:a16="http://schemas.microsoft.com/office/drawing/2014/main" val="1257599333"/>
+                    </a:ext>
+                  </a:extLst>
+                </a:gridCol>
+                <a:gridCol w="1625600">
+                  <a:extLst>
+                    <a:ext uri="{9D8B030D-6E8A-4147-A177-3AD203B41FA5}">
+                      <a16:colId xmlns:a16="http://schemas.microsoft.com/office/drawing/2014/main" val="2090226413"/>
+                    </a:ext>
+                  </a:extLst>
+                </a:gridCol>
+                <a:gridCol w="1625600">
+                  <a:extLst>
+                    <a:ext uri="{9D8B030D-6E8A-4147-A177-3AD203B41FA5}">
+                      <a16:colId xmlns:a16="http://schemas.microsoft.com/office/drawing/2014/main" val="493585771"/>
+                    </a:ext>
+                  </a:extLst>
+                </a:gridCol>
+              </a:tblGrid>
+              <a:tr h="370840">
+                <a:tc>
+                  <a:txBody>
+                    <a:bodyPr/>
+                    <a:lstStyle/>
+                    <a:p>
+                      <a:r>
+                        <a:rPr lang="en-CA" dirty="0"/>
+                        <a:t>Ignition temperature (K)</a:t>
+                      </a:r>
+                    </a:p>
+                  </a:txBody>
+                  <a:tcPr/>
+                </a:tc>
+                <a:tc>
+                  <a:txBody>
+                    <a:bodyPr/>
+                    <a:lstStyle/>
+                    <a:p>
+                      <a:r>
+                        <a:rPr lang="en-CA" dirty="0" err="1"/>
+                        <a:t>Ea</a:t>
+                      </a:r>
+                      <a:r>
+                        <a:rPr lang="en-CA" dirty="0"/>
+                        <a:t> (kJ/</a:t>
+                      </a:r>
+                      <a:r>
+                        <a:rPr lang="en-CA" dirty="0" err="1"/>
+                        <a:t>mol</a:t>
+                      </a:r>
+                      <a:r>
+                        <a:rPr lang="en-CA" dirty="0"/>
+                        <a:t>)</a:t>
+                      </a:r>
+                    </a:p>
+                  </a:txBody>
+                  <a:tcPr/>
+                </a:tc>
+                <a:tc>
+                  <a:txBody>
+                    <a:bodyPr/>
+                    <a:lstStyle/>
+                    <a:p>
+                      <a:r>
+                        <a:rPr lang="en-CA" dirty="0"/>
+                        <a:t>Ignition delay (</a:t>
+                      </a:r>
+                      <a:r>
+                        <a:rPr lang="en-CA" dirty="0" err="1"/>
+                        <a:t>ms</a:t>
+                      </a:r>
+                      <a:r>
+                        <a:rPr lang="en-CA" dirty="0"/>
+                        <a:t>)</a:t>
+                      </a:r>
+                    </a:p>
+                  </a:txBody>
+                  <a:tcPr/>
+                </a:tc>
+                <a:tc>
+                  <a:txBody>
+                    <a:bodyPr/>
+                    <a:lstStyle/>
+                    <a:p>
+                      <a:r>
+                        <a:rPr lang="en-CA" dirty="0"/>
+                        <a:t>Flame front speed (m/s)</a:t>
+                      </a:r>
+                    </a:p>
+                  </a:txBody>
+                  <a:tcPr/>
+                </a:tc>
+                <a:tc>
+                  <a:txBody>
+                    <a:bodyPr/>
+                    <a:lstStyle/>
+                    <a:p>
+                      <a:r>
+                        <a:rPr lang="en-CA" dirty="0"/>
+                        <a:t>OOM Temperature (K)</a:t>
+                      </a:r>
+                    </a:p>
+                  </a:txBody>
+                  <a:tcPr/>
+                </a:tc>
+                <a:extLst>
+                  <a:ext uri="{0D108BD9-81ED-4DB2-BD59-A6C34878D82A}">
+                    <a16:rowId xmlns:a16="http://schemas.microsoft.com/office/drawing/2014/main" val="1635529842"/>
+                  </a:ext>
+                </a:extLst>
+              </a:tr>
+              <a:tr h="370840">
+                <a:tc>
+                  <a:txBody>
+                    <a:bodyPr/>
+                    <a:lstStyle/>
+                    <a:p>
+                      <a:r>
+                        <a:rPr lang="en-CA" dirty="0"/>
+                        <a:t>1200</a:t>
+                      </a:r>
+                    </a:p>
+                  </a:txBody>
+                  <a:tcPr/>
+                </a:tc>
+                <a:tc>
+                  <a:txBody>
+                    <a:bodyPr/>
+                    <a:lstStyle/>
+                    <a:p>
+                      <a:r>
+                        <a:rPr lang="en-CA" dirty="0"/>
+                        <a:t>48</a:t>
+                      </a:r>
+                    </a:p>
+                  </a:txBody>
+                  <a:tcPr/>
+                </a:tc>
+                <a:tc>
+                  <a:txBody>
+                    <a:bodyPr/>
+                    <a:lstStyle/>
+                    <a:p>
+                      <a:r>
+                        <a:rPr lang="en-CA" dirty="0"/>
+                        <a:t>0.049</a:t>
+                      </a:r>
+                    </a:p>
+                  </a:txBody>
+                  <a:tcPr/>
+                </a:tc>
+                <a:tc>
+                  <a:txBody>
+                    <a:bodyPr/>
+                    <a:lstStyle/>
+                    <a:p>
+                      <a:r>
+                        <a:rPr lang="en-CA" dirty="0"/>
+                        <a:t>8.7</a:t>
+                      </a:r>
+                    </a:p>
+                  </a:txBody>
+                  <a:tcPr/>
+                </a:tc>
+                <a:tc>
+                  <a:txBody>
+                    <a:bodyPr/>
+                    <a:lstStyle/>
+                    <a:p>
+                      <a:r>
+                        <a:rPr lang="en-CA" dirty="0"/>
+                        <a:t>n/a</a:t>
+                      </a:r>
+                    </a:p>
+                  </a:txBody>
+                  <a:tcPr/>
+                </a:tc>
+                <a:extLst>
+                  <a:ext uri="{0D108BD9-81ED-4DB2-BD59-A6C34878D82A}">
+                    <a16:rowId xmlns:a16="http://schemas.microsoft.com/office/drawing/2014/main" val="2864532243"/>
+                  </a:ext>
+                </a:extLst>
+              </a:tr>
+              <a:tr h="370840">
+                <a:tc>
+                  <a:txBody>
+                    <a:bodyPr/>
+                    <a:lstStyle/>
+                    <a:p>
+                      <a:r>
+                        <a:rPr lang="en-CA" dirty="0"/>
+                        <a:t>1200</a:t>
+                      </a:r>
+                    </a:p>
+                  </a:txBody>
+                  <a:tcPr/>
+                </a:tc>
+                <a:tc>
+                  <a:txBody>
+                    <a:bodyPr/>
+                    <a:lstStyle/>
+                    <a:p>
+                      <a:r>
+                        <a:rPr lang="en-CA" dirty="0"/>
+                        <a:t>70</a:t>
+                      </a:r>
+                    </a:p>
+                  </a:txBody>
+                  <a:tcPr/>
+                </a:tc>
+                <a:tc>
+                  <a:txBody>
+                    <a:bodyPr/>
+                    <a:lstStyle/>
+                    <a:p>
+                      <a:r>
+                        <a:rPr lang="en-CA" dirty="0"/>
+                        <a:t>0.17</a:t>
+                      </a:r>
+                    </a:p>
+                  </a:txBody>
+                  <a:tcPr/>
+                </a:tc>
+                <a:tc>
+                  <a:txBody>
+                    <a:bodyPr/>
+                    <a:lstStyle/>
+                    <a:p>
+                      <a:r>
+                        <a:rPr lang="en-CA" dirty="0"/>
+                        <a:t>6.9</a:t>
+                      </a:r>
+                    </a:p>
+                  </a:txBody>
+                  <a:tcPr/>
+                </a:tc>
+                <a:tc>
+                  <a:txBody>
+                    <a:bodyPr/>
+                    <a:lstStyle/>
+                    <a:p>
+                      <a:r>
+                        <a:rPr lang="en-CA" dirty="0"/>
+                        <a:t>n/a</a:t>
+                      </a:r>
+                    </a:p>
+                  </a:txBody>
+                  <a:tcPr/>
+                </a:tc>
+                <a:extLst>
+                  <a:ext uri="{0D108BD9-81ED-4DB2-BD59-A6C34878D82A}">
+                    <a16:rowId xmlns:a16="http://schemas.microsoft.com/office/drawing/2014/main" val="3852607871"/>
+                  </a:ext>
+                </a:extLst>
+              </a:tr>
+              <a:tr h="370840">
+                <a:tc>
+                  <a:txBody>
+                    <a:bodyPr/>
+                    <a:lstStyle/>
+                    <a:p>
+                      <a:r>
+                        <a:rPr lang="en-CA" dirty="0"/>
+                        <a:t>1200</a:t>
+                      </a:r>
+                    </a:p>
+                  </a:txBody>
+                  <a:tcPr/>
+                </a:tc>
+                <a:tc>
+                  <a:txBody>
+                    <a:bodyPr/>
+                    <a:lstStyle/>
+                    <a:p>
+                      <a:r>
+                        <a:rPr lang="en-CA" dirty="0"/>
+                        <a:t>78</a:t>
+                      </a:r>
+                    </a:p>
+                  </a:txBody>
+                  <a:tcPr/>
+                </a:tc>
+                <a:tc>
+                  <a:txBody>
+                    <a:bodyPr/>
+                    <a:lstStyle/>
+                    <a:p>
+                      <a:r>
+                        <a:rPr lang="en-CA" dirty="0"/>
+                        <a:t>0.22</a:t>
+                      </a:r>
+                    </a:p>
+                  </a:txBody>
+                  <a:tcPr/>
+                </a:tc>
+                <a:tc>
+                  <a:txBody>
+                    <a:bodyPr/>
+                    <a:lstStyle/>
+                    <a:p>
+                      <a:r>
+                        <a:rPr lang="en-CA" dirty="0"/>
+                        <a:t>0</a:t>
+                      </a:r>
+                    </a:p>
+                  </a:txBody>
+                  <a:tcPr/>
+                </a:tc>
+                <a:tc>
+                  <a:txBody>
+                    <a:bodyPr/>
+                    <a:lstStyle/>
+                    <a:p>
+                      <a:r>
+                        <a:rPr lang="en-CA" dirty="0"/>
+                        <a:t>n/a</a:t>
+                      </a:r>
+                    </a:p>
+                  </a:txBody>
+                  <a:tcPr/>
+                </a:tc>
+                <a:extLst>
+                  <a:ext uri="{0D108BD9-81ED-4DB2-BD59-A6C34878D82A}">
+                    <a16:rowId xmlns:a16="http://schemas.microsoft.com/office/drawing/2014/main" val="1519851890"/>
+                  </a:ext>
+                </a:extLst>
+              </a:tr>
+              <a:tr h="370840">
+                <a:tc>
+                  <a:txBody>
+                    <a:bodyPr/>
+                    <a:lstStyle/>
+                    <a:p>
+                      <a:r>
+                        <a:rPr lang="en-CA" dirty="0"/>
+                        <a:t>1000</a:t>
+                      </a:r>
+                    </a:p>
+                  </a:txBody>
+                  <a:tcPr/>
+                </a:tc>
+                <a:tc>
+                  <a:txBody>
+                    <a:bodyPr/>
+                    <a:lstStyle/>
+                    <a:p>
+                      <a:r>
+                        <a:rPr lang="en-CA" dirty="0"/>
+                        <a:t>70</a:t>
+                      </a:r>
+                    </a:p>
+                  </a:txBody>
+                  <a:tcPr/>
+                </a:tc>
+                <a:tc>
+                  <a:txBody>
+                    <a:bodyPr/>
+                    <a:lstStyle/>
+                    <a:p>
+                      <a:r>
+                        <a:rPr lang="en-CA" dirty="0"/>
+                        <a:t>0.15</a:t>
+                      </a:r>
+                    </a:p>
+                  </a:txBody>
+                  <a:tcPr/>
+                </a:tc>
+                <a:tc>
+                  <a:txBody>
+                    <a:bodyPr/>
+                    <a:lstStyle/>
+                    <a:p>
+                      <a:r>
+                        <a:rPr lang="en-CA" dirty="0"/>
+                        <a:t>0</a:t>
+                      </a:r>
+                    </a:p>
+                  </a:txBody>
+                  <a:tcPr/>
+                </a:tc>
+                <a:tc>
+                  <a:txBody>
+                    <a:bodyPr/>
+                    <a:lstStyle/>
+                    <a:p>
+                      <a:r>
+                        <a:rPr lang="en-CA" dirty="0"/>
+                        <a:t>500</a:t>
+                      </a:r>
+                    </a:p>
+                  </a:txBody>
+                  <a:tcPr/>
+                </a:tc>
+                <a:extLst>
+                  <a:ext uri="{0D108BD9-81ED-4DB2-BD59-A6C34878D82A}">
+                    <a16:rowId xmlns:a16="http://schemas.microsoft.com/office/drawing/2014/main" val="1761035812"/>
+                  </a:ext>
+                </a:extLst>
+              </a:tr>
+              <a:tr h="370840">
+                <a:tc>
+                  <a:txBody>
+                    <a:bodyPr/>
+                    <a:lstStyle/>
+                    <a:p>
+                      <a:r>
+                        <a:rPr lang="en-CA" dirty="0"/>
+                        <a:t>900</a:t>
+                      </a:r>
+                    </a:p>
+                  </a:txBody>
+                  <a:tcPr/>
+                </a:tc>
+                <a:tc>
+                  <a:txBody>
+                    <a:bodyPr/>
+                    <a:lstStyle/>
+                    <a:p>
+                      <a:r>
+                        <a:rPr lang="en-CA" dirty="0"/>
+                        <a:t>70</a:t>
+                      </a:r>
+                    </a:p>
+                  </a:txBody>
+                  <a:tcPr/>
+                </a:tc>
+                <a:tc>
+                  <a:txBody>
+                    <a:bodyPr/>
+                    <a:lstStyle/>
+                    <a:p>
+                      <a:r>
+                        <a:rPr lang="en-CA" dirty="0"/>
+                        <a:t>0.13</a:t>
+                      </a:r>
+                    </a:p>
+                  </a:txBody>
+                  <a:tcPr/>
+                </a:tc>
+                <a:tc>
+                  <a:txBody>
+                    <a:bodyPr/>
+                    <a:lstStyle/>
+                    <a:p>
+                      <a:r>
+                        <a:rPr lang="en-CA" dirty="0"/>
+                        <a:t>0</a:t>
+                      </a:r>
+                    </a:p>
+                  </a:txBody>
+                  <a:tcPr/>
+                </a:tc>
+                <a:tc>
+                  <a:txBody>
+                    <a:bodyPr/>
+                    <a:lstStyle/>
+                    <a:p>
+                      <a:r>
+                        <a:rPr lang="en-CA" dirty="0"/>
+                        <a:t>460</a:t>
+                      </a:r>
+                    </a:p>
+                  </a:txBody>
+                  <a:tcPr/>
+                </a:tc>
+                <a:extLst>
+                  <a:ext uri="{0D108BD9-81ED-4DB2-BD59-A6C34878D82A}">
+                    <a16:rowId xmlns:a16="http://schemas.microsoft.com/office/drawing/2014/main" val="1021781723"/>
+                  </a:ext>
+                </a:extLst>
+              </a:tr>
+              <a:tr h="370840">
+                <a:tc>
+                  <a:txBody>
+                    <a:bodyPr/>
+                    <a:lstStyle/>
+                    <a:p>
+                      <a:r>
+                        <a:rPr lang="en-CA" dirty="0"/>
+                        <a:t>800</a:t>
+                      </a:r>
+                    </a:p>
+                  </a:txBody>
+                  <a:tcPr/>
+                </a:tc>
+                <a:tc>
+                  <a:txBody>
+                    <a:bodyPr/>
+                    <a:lstStyle/>
+                    <a:p>
+                      <a:r>
+                        <a:rPr lang="en-CA" dirty="0"/>
+                        <a:t>48</a:t>
+                      </a:r>
+                    </a:p>
+                  </a:txBody>
+                  <a:tcPr/>
+                </a:tc>
+                <a:tc>
+                  <a:txBody>
+                    <a:bodyPr/>
+                    <a:lstStyle/>
+                    <a:p>
+                      <a:r>
+                        <a:rPr lang="en-CA" dirty="0"/>
+                        <a:t>0.045</a:t>
+                      </a:r>
+                    </a:p>
+                  </a:txBody>
+                  <a:tcPr/>
+                </a:tc>
+                <a:tc>
+                  <a:txBody>
+                    <a:bodyPr/>
+                    <a:lstStyle/>
+                    <a:p>
+                      <a:r>
+                        <a:rPr lang="en-CA" dirty="0"/>
+                        <a:t>n/a</a:t>
+                      </a:r>
+                    </a:p>
+                  </a:txBody>
+                  <a:tcPr/>
+                </a:tc>
+                <a:tc>
+                  <a:txBody>
+                    <a:bodyPr/>
+                    <a:lstStyle/>
+                    <a:p>
+                      <a:r>
+                        <a:rPr lang="en-CA" dirty="0"/>
+                        <a:t>n/a</a:t>
+                      </a:r>
+                    </a:p>
+                  </a:txBody>
+                  <a:tcPr/>
+                </a:tc>
+                <a:extLst>
+                  <a:ext uri="{0D108BD9-81ED-4DB2-BD59-A6C34878D82A}">
+                    <a16:rowId xmlns:a16="http://schemas.microsoft.com/office/drawing/2014/main" val="3857353229"/>
+                  </a:ext>
+                </a:extLst>
+              </a:tr>
+              <a:tr h="370840">
+                <a:tc>
+                  <a:txBody>
+                    <a:bodyPr/>
+                    <a:lstStyle/>
+                    <a:p>
+                      <a:r>
+                        <a:rPr lang="en-CA" dirty="0"/>
+                        <a:t>800</a:t>
+                      </a:r>
+                    </a:p>
+                  </a:txBody>
+                  <a:tcPr/>
+                </a:tc>
+                <a:tc>
+                  <a:txBody>
+                    <a:bodyPr/>
+                    <a:lstStyle/>
+                    <a:p>
+                      <a:r>
+                        <a:rPr lang="en-CA" dirty="0"/>
+                        <a:t>70</a:t>
+                      </a:r>
+                    </a:p>
+                  </a:txBody>
+                  <a:tcPr/>
+                </a:tc>
+                <a:tc>
+                  <a:txBody>
+                    <a:bodyPr/>
+                    <a:lstStyle/>
+                    <a:p>
+                      <a:r>
+                        <a:rPr lang="en-CA" dirty="0"/>
+                        <a:t>0.096</a:t>
+                      </a:r>
+                    </a:p>
+                  </a:txBody>
+                  <a:tcPr/>
+                </a:tc>
+                <a:tc>
+                  <a:txBody>
+                    <a:bodyPr/>
+                    <a:lstStyle/>
+                    <a:p>
+                      <a:r>
+                        <a:rPr lang="en-CA" dirty="0"/>
+                        <a:t>0</a:t>
+                      </a:r>
+                    </a:p>
+                  </a:txBody>
+                  <a:tcPr/>
+                </a:tc>
+                <a:tc>
+                  <a:txBody>
+                    <a:bodyPr/>
+                    <a:lstStyle/>
+                    <a:p>
+                      <a:r>
+                        <a:rPr lang="en-CA" dirty="0"/>
+                        <a:t>400</a:t>
+                      </a:r>
+                    </a:p>
+                  </a:txBody>
+                  <a:tcPr/>
+                </a:tc>
+                <a:extLst>
+                  <a:ext uri="{0D108BD9-81ED-4DB2-BD59-A6C34878D82A}">
+                    <a16:rowId xmlns:a16="http://schemas.microsoft.com/office/drawing/2014/main" val="1343146158"/>
+                  </a:ext>
+                </a:extLst>
+              </a:tr>
+              <a:tr h="370840">
+                <a:tc>
+                  <a:txBody>
+                    <a:bodyPr/>
+                    <a:lstStyle/>
+                    <a:p>
+                      <a:endParaRPr lang="en-CA" dirty="0"/>
+                    </a:p>
+                  </a:txBody>
+                  <a:tcPr/>
+                </a:tc>
+                <a:tc>
+                  <a:txBody>
+                    <a:bodyPr/>
+                    <a:lstStyle/>
+                    <a:p>
+                      <a:endParaRPr lang="en-CA" dirty="0"/>
+                    </a:p>
+                  </a:txBody>
+                  <a:tcPr/>
+                </a:tc>
+                <a:tc>
+                  <a:txBody>
+                    <a:bodyPr/>
+                    <a:lstStyle/>
+                    <a:p>
+                      <a:endParaRPr lang="en-CA" dirty="0"/>
+                    </a:p>
+                  </a:txBody>
+                  <a:tcPr/>
+                </a:tc>
+                <a:tc>
+                  <a:txBody>
+                    <a:bodyPr/>
+                    <a:lstStyle/>
+                    <a:p>
+                      <a:endParaRPr lang="en-CA" dirty="0"/>
+                    </a:p>
+                  </a:txBody>
+                  <a:tcPr/>
+                </a:tc>
+                <a:tc>
+                  <a:txBody>
+                    <a:bodyPr/>
+                    <a:lstStyle/>
+                    <a:p>
+                      <a:endParaRPr lang="en-CA" dirty="0"/>
+                    </a:p>
+                  </a:txBody>
+                  <a:tcPr/>
+                </a:tc>
+                <a:extLst>
+                  <a:ext uri="{0D108BD9-81ED-4DB2-BD59-A6C34878D82A}">
+                    <a16:rowId xmlns:a16="http://schemas.microsoft.com/office/drawing/2014/main" val="1515650617"/>
+                  </a:ext>
+                </a:extLst>
+              </a:tr>
+              <a:tr h="370840">
+                <a:tc>
+                  <a:txBody>
+                    <a:bodyPr/>
+                    <a:lstStyle/>
+                    <a:p>
+                      <a:endParaRPr lang="en-CA" dirty="0"/>
+                    </a:p>
+                  </a:txBody>
+                  <a:tcPr/>
+                </a:tc>
+                <a:tc>
+                  <a:txBody>
+                    <a:bodyPr/>
+                    <a:lstStyle/>
+                    <a:p>
+                      <a:endParaRPr lang="en-CA" dirty="0"/>
+                    </a:p>
+                  </a:txBody>
+                  <a:tcPr/>
+                </a:tc>
+                <a:tc>
+                  <a:txBody>
+                    <a:bodyPr/>
+                    <a:lstStyle/>
+                    <a:p>
+                      <a:endParaRPr lang="en-CA" dirty="0"/>
+                    </a:p>
+                  </a:txBody>
+                  <a:tcPr/>
+                </a:tc>
+                <a:tc>
+                  <a:txBody>
+                    <a:bodyPr/>
+                    <a:lstStyle/>
+                    <a:p>
+                      <a:endParaRPr lang="en-CA" dirty="0"/>
+                    </a:p>
+                  </a:txBody>
+                  <a:tcPr/>
+                </a:tc>
+                <a:tc>
+                  <a:txBody>
+                    <a:bodyPr/>
+                    <a:lstStyle/>
+                    <a:p>
+                      <a:endParaRPr lang="en-CA" dirty="0"/>
+                    </a:p>
+                  </a:txBody>
+                  <a:tcPr/>
+                </a:tc>
+                <a:extLst>
+                  <a:ext uri="{0D108BD9-81ED-4DB2-BD59-A6C34878D82A}">
+                    <a16:rowId xmlns:a16="http://schemas.microsoft.com/office/drawing/2014/main" val="1037442498"/>
+                  </a:ext>
+                </a:extLst>
+              </a:tr>
+            </a:tbl>
+          </a:graphicData>
+        </a:graphic>
+      </p:graphicFrame>
+      <p:sp>
+        <p:nvSpPr>
+          <p:cNvPr id="16" name="TextBox 15">
+            <a:extLst>
+              <a:ext uri="{FF2B5EF4-FFF2-40B4-BE49-F238E27FC236}">
+                <a16:creationId xmlns:a16="http://schemas.microsoft.com/office/drawing/2014/main" id="{BDD5F850-51E3-441A-BDB4-F1299C208FA8}"/>
+              </a:ext>
+            </a:extLst>
+          </p:cNvPr>
+          <p:cNvSpPr txBox="1"/>
+          <p:nvPr/>
+        </p:nvSpPr>
+        <p:spPr>
+          <a:xfrm>
+            <a:off x="0" y="1796620"/>
+            <a:ext cx="1638773" cy="369332"/>
+          </a:xfrm>
+          <a:prstGeom prst="rect">
+            <a:avLst/>
+          </a:prstGeom>
+          <a:noFill/>
+        </p:spPr>
+        <p:txBody>
+          <a:bodyPr wrap="square" rtlCol="0">
+            <a:spAutoFit/>
+          </a:bodyPr>
+          <a:lstStyle/>
+          <a:p>
+            <a:r>
+              <a:rPr lang="en-CA" dirty="0"/>
+              <a:t>Tign-1</a:t>
+            </a:r>
+          </a:p>
+        </p:txBody>
+      </p:sp>
+      <p:sp>
+        <p:nvSpPr>
+          <p:cNvPr id="17" name="TextBox 16">
+            <a:extLst>
+              <a:ext uri="{FF2B5EF4-FFF2-40B4-BE49-F238E27FC236}">
+                <a16:creationId xmlns:a16="http://schemas.microsoft.com/office/drawing/2014/main" id="{7783F8D5-363D-47D4-8453-7847F7997BFF}"/>
+              </a:ext>
+            </a:extLst>
+          </p:cNvPr>
+          <p:cNvSpPr txBox="1"/>
+          <p:nvPr/>
+        </p:nvSpPr>
+        <p:spPr>
+          <a:xfrm>
+            <a:off x="0" y="2165952"/>
+            <a:ext cx="1638773" cy="369332"/>
+          </a:xfrm>
+          <a:prstGeom prst="rect">
+            <a:avLst/>
+          </a:prstGeom>
+          <a:noFill/>
+        </p:spPr>
+        <p:txBody>
+          <a:bodyPr wrap="square" rtlCol="0">
+            <a:spAutoFit/>
+          </a:bodyPr>
+          <a:lstStyle/>
+          <a:p>
+            <a:r>
+              <a:rPr lang="en-CA" dirty="0"/>
+              <a:t>Tign-2</a:t>
+            </a:r>
+          </a:p>
+        </p:txBody>
+      </p:sp>
+      <p:sp>
+        <p:nvSpPr>
+          <p:cNvPr id="19" name="TextBox 18">
+            <a:extLst>
+              <a:ext uri="{FF2B5EF4-FFF2-40B4-BE49-F238E27FC236}">
+                <a16:creationId xmlns:a16="http://schemas.microsoft.com/office/drawing/2014/main" id="{6E733EC7-E23C-427B-941F-6334325A3265}"/>
+              </a:ext>
+            </a:extLst>
+          </p:cNvPr>
+          <p:cNvSpPr txBox="1"/>
+          <p:nvPr/>
+        </p:nvSpPr>
+        <p:spPr>
+          <a:xfrm>
+            <a:off x="0" y="2543755"/>
+            <a:ext cx="1638773" cy="369332"/>
+          </a:xfrm>
+          <a:prstGeom prst="rect">
+            <a:avLst/>
+          </a:prstGeom>
+          <a:noFill/>
+        </p:spPr>
+        <p:txBody>
+          <a:bodyPr wrap="square" rtlCol="0">
+            <a:spAutoFit/>
+          </a:bodyPr>
+          <a:lstStyle/>
+          <a:p>
+            <a:r>
+              <a:rPr lang="en-CA" dirty="0"/>
+              <a:t>Tign-3</a:t>
+            </a:r>
+          </a:p>
+        </p:txBody>
+      </p:sp>
+      <p:sp>
+        <p:nvSpPr>
+          <p:cNvPr id="20" name="TextBox 19">
+            <a:extLst>
+              <a:ext uri="{FF2B5EF4-FFF2-40B4-BE49-F238E27FC236}">
+                <a16:creationId xmlns:a16="http://schemas.microsoft.com/office/drawing/2014/main" id="{33087DBD-AB50-4625-B976-D04C6166243E}"/>
+              </a:ext>
+            </a:extLst>
+          </p:cNvPr>
+          <p:cNvSpPr txBox="1"/>
+          <p:nvPr/>
+        </p:nvSpPr>
+        <p:spPr>
+          <a:xfrm>
+            <a:off x="-1" y="2921558"/>
+            <a:ext cx="1638773" cy="369332"/>
+          </a:xfrm>
+          <a:prstGeom prst="rect">
+            <a:avLst/>
+          </a:prstGeom>
+          <a:noFill/>
+        </p:spPr>
+        <p:txBody>
+          <a:bodyPr wrap="square" rtlCol="0">
+            <a:spAutoFit/>
+          </a:bodyPr>
+          <a:lstStyle/>
+          <a:p>
+            <a:r>
+              <a:rPr lang="en-CA" dirty="0"/>
+              <a:t>Tign-6</a:t>
+            </a:r>
+          </a:p>
+        </p:txBody>
+      </p:sp>
+      <p:sp>
+        <p:nvSpPr>
+          <p:cNvPr id="21" name="TextBox 20">
+            <a:extLst>
+              <a:ext uri="{FF2B5EF4-FFF2-40B4-BE49-F238E27FC236}">
+                <a16:creationId xmlns:a16="http://schemas.microsoft.com/office/drawing/2014/main" id="{6B8ECE04-1B82-49C1-9BB3-914A1C511857}"/>
+              </a:ext>
+            </a:extLst>
+          </p:cNvPr>
+          <p:cNvSpPr txBox="1"/>
+          <p:nvPr/>
+        </p:nvSpPr>
+        <p:spPr>
+          <a:xfrm>
+            <a:off x="-2" y="3307832"/>
+            <a:ext cx="1638773" cy="369332"/>
+          </a:xfrm>
+          <a:prstGeom prst="rect">
+            <a:avLst/>
+          </a:prstGeom>
+          <a:noFill/>
+        </p:spPr>
+        <p:txBody>
+          <a:bodyPr wrap="square" rtlCol="0">
+            <a:spAutoFit/>
+          </a:bodyPr>
+          <a:lstStyle/>
+          <a:p>
+            <a:r>
+              <a:rPr lang="en-CA" dirty="0"/>
+              <a:t>Tign-5</a:t>
+            </a:r>
+          </a:p>
+        </p:txBody>
+      </p:sp>
+      <p:sp>
+        <p:nvSpPr>
+          <p:cNvPr id="22" name="TextBox 21">
+            <a:extLst>
+              <a:ext uri="{FF2B5EF4-FFF2-40B4-BE49-F238E27FC236}">
+                <a16:creationId xmlns:a16="http://schemas.microsoft.com/office/drawing/2014/main" id="{84ED005B-CAFA-41B5-BC71-EDF92F4BEEE0}"/>
+              </a:ext>
+            </a:extLst>
+          </p:cNvPr>
+          <p:cNvSpPr txBox="1"/>
+          <p:nvPr/>
+        </p:nvSpPr>
+        <p:spPr>
+          <a:xfrm>
+            <a:off x="0" y="3668693"/>
+            <a:ext cx="1638773" cy="369332"/>
+          </a:xfrm>
+          <a:prstGeom prst="rect">
+            <a:avLst/>
+          </a:prstGeom>
+          <a:noFill/>
+        </p:spPr>
+        <p:txBody>
+          <a:bodyPr wrap="square" rtlCol="0">
+            <a:spAutoFit/>
+          </a:bodyPr>
+          <a:lstStyle/>
+          <a:p>
+            <a:r>
+              <a:rPr lang="en-CA" dirty="0"/>
+              <a:t>Tign-7</a:t>
+            </a:r>
+          </a:p>
+        </p:txBody>
+      </p:sp>
+      <p:sp>
+        <p:nvSpPr>
+          <p:cNvPr id="23" name="TextBox 22">
+            <a:extLst>
+              <a:ext uri="{FF2B5EF4-FFF2-40B4-BE49-F238E27FC236}">
+                <a16:creationId xmlns:a16="http://schemas.microsoft.com/office/drawing/2014/main" id="{C2692C11-923C-4A2F-802E-210DCF0155B1}"/>
+              </a:ext>
+            </a:extLst>
+          </p:cNvPr>
+          <p:cNvSpPr txBox="1"/>
+          <p:nvPr/>
+        </p:nvSpPr>
+        <p:spPr>
+          <a:xfrm>
+            <a:off x="-3" y="4029554"/>
+            <a:ext cx="1638773" cy="369332"/>
+          </a:xfrm>
+          <a:prstGeom prst="rect">
+            <a:avLst/>
+          </a:prstGeom>
+          <a:noFill/>
+        </p:spPr>
+        <p:txBody>
+          <a:bodyPr wrap="square" rtlCol="0">
+            <a:spAutoFit/>
+          </a:bodyPr>
+          <a:lstStyle/>
+          <a:p>
+            <a:r>
+              <a:rPr lang="en-CA" dirty="0"/>
+              <a:t>Tign-4</a:t>
+            </a:r>
+          </a:p>
+        </p:txBody>
+      </p:sp>
+    </p:spTree>
+    <p:extLst>
+      <p:ext uri="{BB962C8B-B14F-4D97-AF65-F5344CB8AC3E}">
+        <p14:creationId xmlns:p14="http://schemas.microsoft.com/office/powerpoint/2010/main" val="642388822"/>
+      </p:ext>
+    </p:extLst>
+  </p:cSld>
+  <p:clrMapOvr>
+    <a:masterClrMapping/>
+  </p:clrMapOvr>
+</p:sld>
+</file>
+
+<file path=ppt/slides/slide8.xml><?xml version="1.0" encoding="utf-8"?>
+<p:sld xmlns:a="http://schemas.openxmlformats.org/drawingml/2006/main" xmlns:r="http://schemas.openxmlformats.org/officeDocument/2006/relationships" xmlns:p="http://schemas.openxmlformats.org/presentationml/2006/main">
+  <p:cSld>
+    <p:spTree>
+      <p:nvGrpSpPr>
+        <p:cNvPr id="1" name=""/>
+        <p:cNvGrpSpPr/>
+        <p:nvPr/>
+      </p:nvGrpSpPr>
+      <p:grpSpPr>
+        <a:xfrm>
+          <a:off x="0" y="0"/>
+          <a:ext cx="0" cy="0"/>
+          <a:chOff x="0" y="0"/>
+          <a:chExt cx="0" cy="0"/>
+        </a:xfrm>
+      </p:grpSpPr>
+      <p:sp>
+        <p:nvSpPr>
+          <p:cNvPr id="9" name="TextBox 8">
+            <a:extLst>
+              <a:ext uri="{FF2B5EF4-FFF2-40B4-BE49-F238E27FC236}">
+                <a16:creationId xmlns:a16="http://schemas.microsoft.com/office/drawing/2014/main" id="{41A3C277-5DAA-4D2F-A5CA-FC7C758FC832}"/>
+              </a:ext>
+            </a:extLst>
+          </p:cNvPr>
+          <p:cNvSpPr txBox="1"/>
+          <p:nvPr/>
+        </p:nvSpPr>
+        <p:spPr>
+          <a:xfrm>
+            <a:off x="377504" y="233318"/>
+            <a:ext cx="2807971" cy="646331"/>
+          </a:xfrm>
+          <a:prstGeom prst="rect">
+            <a:avLst/>
+          </a:prstGeom>
+          <a:noFill/>
+        </p:spPr>
+        <p:txBody>
+          <a:bodyPr wrap="square" rtlCol="0">
+            <a:spAutoFit/>
+          </a:bodyPr>
+          <a:lstStyle/>
+          <a:p>
+            <a:r>
+              <a:rPr lang="en-CA" b="1" dirty="0"/>
+              <a:t>Enthalpy of Combustion investigations</a:t>
+            </a:r>
+          </a:p>
+        </p:txBody>
+      </p:sp>
+      <p:sp>
+        <p:nvSpPr>
+          <p:cNvPr id="14" name="TextBox 13">
+            <a:extLst>
+              <a:ext uri="{FF2B5EF4-FFF2-40B4-BE49-F238E27FC236}">
+                <a16:creationId xmlns:a16="http://schemas.microsoft.com/office/drawing/2014/main" id="{E3279457-A7C5-4C63-9E4D-93D391564F8C}"/>
+              </a:ext>
+            </a:extLst>
+          </p:cNvPr>
+          <p:cNvSpPr txBox="1"/>
+          <p:nvPr/>
+        </p:nvSpPr>
+        <p:spPr>
+          <a:xfrm>
+            <a:off x="3185476" y="233318"/>
+            <a:ext cx="8332756" cy="369332"/>
+          </a:xfrm>
+          <a:prstGeom prst="rect">
+            <a:avLst/>
+          </a:prstGeom>
+          <a:noFill/>
+        </p:spPr>
+        <p:txBody>
+          <a:bodyPr wrap="square" rtlCol="0">
+            <a:spAutoFit/>
+          </a:bodyPr>
+          <a:lstStyle/>
+          <a:p>
+            <a:r>
+              <a:rPr lang="en-CA" dirty="0"/>
+              <a:t>A0=4.89e6, </a:t>
+            </a:r>
+            <a:r>
+              <a:rPr lang="en-CA" dirty="0" err="1"/>
+              <a:t>Ea</a:t>
+            </a:r>
+            <a:r>
+              <a:rPr lang="en-CA" dirty="0"/>
+              <a:t>=48 kJ/</a:t>
+            </a:r>
+            <a:r>
+              <a:rPr lang="en-CA" dirty="0" err="1"/>
+              <a:t>mol</a:t>
+            </a:r>
+            <a:r>
+              <a:rPr lang="en-CA" dirty="0"/>
+              <a:t>, Flux=200 MW/m^2, </a:t>
+            </a:r>
+            <a:r>
+              <a:rPr lang="en-CA" dirty="0" err="1"/>
+              <a:t>T_ign</a:t>
+            </a:r>
+            <a:r>
+              <a:rPr lang="en-CA" dirty="0"/>
+              <a:t>=1200 K  </a:t>
+            </a:r>
+          </a:p>
+        </p:txBody>
+      </p:sp>
+      <p:graphicFrame>
+        <p:nvGraphicFramePr>
+          <p:cNvPr id="6" name="Table 5">
+            <a:extLst>
+              <a:ext uri="{FF2B5EF4-FFF2-40B4-BE49-F238E27FC236}">
+                <a16:creationId xmlns:a16="http://schemas.microsoft.com/office/drawing/2014/main" id="{263F9B4A-A05C-4F29-AC5B-772A0929E7FC}"/>
+              </a:ext>
+            </a:extLst>
+          </p:cNvPr>
+          <p:cNvGraphicFramePr>
+            <a:graphicFrameLocks noGrp="1"/>
+          </p:cNvGraphicFramePr>
+          <p:nvPr>
+            <p:extLst>
+              <p:ext uri="{D42A27DB-BD31-4B8C-83A1-F6EECF244321}">
+                <p14:modId xmlns:p14="http://schemas.microsoft.com/office/powerpoint/2010/main" val="3806295979"/>
+              </p:ext>
+            </p:extLst>
+          </p:nvPr>
+        </p:nvGraphicFramePr>
+        <p:xfrm>
+          <a:off x="2032000" y="992713"/>
+          <a:ext cx="8128000" cy="4251960"/>
+        </p:xfrm>
+        <a:graphic>
+          <a:graphicData uri="http://schemas.openxmlformats.org/drawingml/2006/table">
+            <a:tbl>
+              <a:tblPr firstRow="1" bandRow="1">
+                <a:tableStyleId>{5C22544A-7EE6-4342-B048-85BDC9FD1C3A}</a:tableStyleId>
+              </a:tblPr>
+              <a:tblGrid>
+                <a:gridCol w="1625600">
+                  <a:extLst>
+                    <a:ext uri="{9D8B030D-6E8A-4147-A177-3AD203B41FA5}">
+                      <a16:colId xmlns:a16="http://schemas.microsoft.com/office/drawing/2014/main" val="255438585"/>
+                    </a:ext>
+                  </a:extLst>
+                </a:gridCol>
+                <a:gridCol w="1625600">
+                  <a:extLst>
+                    <a:ext uri="{9D8B030D-6E8A-4147-A177-3AD203B41FA5}">
+                      <a16:colId xmlns:a16="http://schemas.microsoft.com/office/drawing/2014/main" val="2572141942"/>
+                    </a:ext>
+                  </a:extLst>
+                </a:gridCol>
+                <a:gridCol w="1625600">
+                  <a:extLst>
+                    <a:ext uri="{9D8B030D-6E8A-4147-A177-3AD203B41FA5}">
+                      <a16:colId xmlns:a16="http://schemas.microsoft.com/office/drawing/2014/main" val="1257599333"/>
+                    </a:ext>
+                  </a:extLst>
+                </a:gridCol>
+                <a:gridCol w="1625600">
+                  <a:extLst>
+                    <a:ext uri="{9D8B030D-6E8A-4147-A177-3AD203B41FA5}">
+                      <a16:colId xmlns:a16="http://schemas.microsoft.com/office/drawing/2014/main" val="2090226413"/>
+                    </a:ext>
+                  </a:extLst>
+                </a:gridCol>
+                <a:gridCol w="1625600">
+                  <a:extLst>
+                    <a:ext uri="{9D8B030D-6E8A-4147-A177-3AD203B41FA5}">
+                      <a16:colId xmlns:a16="http://schemas.microsoft.com/office/drawing/2014/main" val="493585771"/>
+                    </a:ext>
+                  </a:extLst>
+                </a:gridCol>
+              </a:tblGrid>
+              <a:tr h="370840">
+                <a:tc>
+                  <a:txBody>
+                    <a:bodyPr/>
+                    <a:lstStyle/>
+                    <a:p>
+                      <a:r>
+                        <a:rPr lang="en-CA" dirty="0"/>
+                        <a:t>Enthalpy of Combustion (various)</a:t>
+                      </a:r>
+                    </a:p>
+                  </a:txBody>
+                  <a:tcPr/>
+                </a:tc>
+                <a:tc>
+                  <a:txBody>
+                    <a:bodyPr/>
+                    <a:lstStyle/>
+                    <a:p>
+                      <a:endParaRPr lang="en-CA" dirty="0"/>
+                    </a:p>
+                  </a:txBody>
+                  <a:tcPr/>
+                </a:tc>
+                <a:tc>
+                  <a:txBody>
+                    <a:bodyPr/>
+                    <a:lstStyle/>
+                    <a:p>
+                      <a:r>
+                        <a:rPr lang="en-CA" dirty="0"/>
+                        <a:t>Ignition delay (</a:t>
+                      </a:r>
+                      <a:r>
+                        <a:rPr lang="en-CA" dirty="0" err="1"/>
+                        <a:t>ms</a:t>
+                      </a:r>
+                      <a:r>
+                        <a:rPr lang="en-CA" dirty="0"/>
+                        <a:t>)</a:t>
+                      </a:r>
+                    </a:p>
+                  </a:txBody>
+                  <a:tcPr/>
+                </a:tc>
+                <a:tc>
+                  <a:txBody>
+                    <a:bodyPr/>
+                    <a:lstStyle/>
+                    <a:p>
+                      <a:r>
+                        <a:rPr lang="en-CA" dirty="0"/>
+                        <a:t>Flame front speed (m/s)</a:t>
+                      </a:r>
+                    </a:p>
+                  </a:txBody>
+                  <a:tcPr/>
+                </a:tc>
+                <a:tc>
+                  <a:txBody>
+                    <a:bodyPr/>
+                    <a:lstStyle/>
+                    <a:p>
+                      <a:r>
+                        <a:rPr lang="en-CA" dirty="0"/>
+                        <a:t>OOM Temperature (K)</a:t>
+                      </a:r>
+                    </a:p>
+                  </a:txBody>
+                  <a:tcPr/>
+                </a:tc>
+                <a:extLst>
+                  <a:ext uri="{0D108BD9-81ED-4DB2-BD59-A6C34878D82A}">
+                    <a16:rowId xmlns:a16="http://schemas.microsoft.com/office/drawing/2014/main" val="1635529842"/>
+                  </a:ext>
+                </a:extLst>
+              </a:tr>
+              <a:tr h="370840">
+                <a:tc>
+                  <a:txBody>
+                    <a:bodyPr/>
+                    <a:lstStyle/>
+                    <a:p>
+                      <a:r>
+                        <a:rPr lang="en-CA" dirty="0"/>
+                        <a:t>63 MJ/m^3</a:t>
+                      </a:r>
+                    </a:p>
+                  </a:txBody>
+                  <a:tcPr/>
+                </a:tc>
+                <a:tc>
+                  <a:txBody>
+                    <a:bodyPr/>
+                    <a:lstStyle/>
+                    <a:p>
+                      <a:endParaRPr lang="en-CA" dirty="0"/>
+                    </a:p>
+                  </a:txBody>
+                  <a:tcPr/>
+                </a:tc>
+                <a:tc>
+                  <a:txBody>
+                    <a:bodyPr/>
+                    <a:lstStyle/>
+                    <a:p>
+                      <a:r>
+                        <a:rPr lang="en-CA" dirty="0"/>
+                        <a:t>0.4</a:t>
+                      </a:r>
+                    </a:p>
+                  </a:txBody>
+                  <a:tcPr/>
+                </a:tc>
+                <a:tc>
+                  <a:txBody>
+                    <a:bodyPr/>
+                    <a:lstStyle/>
+                    <a:p>
+                      <a:r>
+                        <a:rPr lang="en-CA" dirty="0"/>
+                        <a:t>1.7</a:t>
+                      </a:r>
+                    </a:p>
+                  </a:txBody>
+                  <a:tcPr/>
+                </a:tc>
+                <a:tc>
+                  <a:txBody>
+                    <a:bodyPr/>
+                    <a:lstStyle/>
+                    <a:p>
+                      <a:r>
+                        <a:rPr lang="en-CA" dirty="0"/>
+                        <a:t>2500</a:t>
+                      </a:r>
+                    </a:p>
+                  </a:txBody>
+                  <a:tcPr/>
+                </a:tc>
+                <a:extLst>
+                  <a:ext uri="{0D108BD9-81ED-4DB2-BD59-A6C34878D82A}">
+                    <a16:rowId xmlns:a16="http://schemas.microsoft.com/office/drawing/2014/main" val="2864532243"/>
+                  </a:ext>
+                </a:extLst>
+              </a:tr>
+              <a:tr h="370840">
+                <a:tc>
+                  <a:txBody>
+                    <a:bodyPr/>
+                    <a:lstStyle/>
+                    <a:p>
+                      <a:r>
+                        <a:rPr lang="en-CA" dirty="0"/>
+                        <a:t>4.07 MJ/kg</a:t>
+                      </a:r>
+                    </a:p>
+                  </a:txBody>
+                  <a:tcPr/>
+                </a:tc>
+                <a:tc>
+                  <a:txBody>
+                    <a:bodyPr/>
+                    <a:lstStyle/>
+                    <a:p>
+                      <a:endParaRPr lang="en-CA" dirty="0"/>
+                    </a:p>
+                  </a:txBody>
+                  <a:tcPr/>
+                </a:tc>
+                <a:tc>
+                  <a:txBody>
+                    <a:bodyPr/>
+                    <a:lstStyle/>
+                    <a:p>
+                      <a:r>
+                        <a:rPr lang="en-CA" dirty="0"/>
+                        <a:t>0.22</a:t>
+                      </a:r>
+                    </a:p>
+                  </a:txBody>
+                  <a:tcPr/>
+                </a:tc>
+                <a:tc>
+                  <a:txBody>
+                    <a:bodyPr/>
+                    <a:lstStyle/>
+                    <a:p>
+                      <a:r>
+                        <a:rPr lang="en-CA" dirty="0"/>
+                        <a:t>5.2</a:t>
+                      </a:r>
+                    </a:p>
+                  </a:txBody>
+                  <a:tcPr/>
+                </a:tc>
+                <a:tc>
+                  <a:txBody>
+                    <a:bodyPr/>
+                    <a:lstStyle/>
+                    <a:p>
+                      <a:r>
+                        <a:rPr lang="en-CA" dirty="0"/>
+                        <a:t>9000</a:t>
+                      </a:r>
+                    </a:p>
+                  </a:txBody>
+                  <a:tcPr/>
+                </a:tc>
+                <a:extLst>
+                  <a:ext uri="{0D108BD9-81ED-4DB2-BD59-A6C34878D82A}">
+                    <a16:rowId xmlns:a16="http://schemas.microsoft.com/office/drawing/2014/main" val="3852607871"/>
+                  </a:ext>
+                </a:extLst>
+              </a:tr>
+              <a:tr h="370840">
+                <a:tc>
+                  <a:txBody>
+                    <a:bodyPr/>
+                    <a:lstStyle/>
+                    <a:p>
+                      <a:endParaRPr lang="en-CA" dirty="0"/>
+                    </a:p>
+                  </a:txBody>
+                  <a:tcPr/>
+                </a:tc>
+                <a:tc>
+                  <a:txBody>
+                    <a:bodyPr/>
+                    <a:lstStyle/>
+                    <a:p>
+                      <a:endParaRPr lang="en-CA" dirty="0"/>
+                    </a:p>
+                  </a:txBody>
+                  <a:tcPr/>
+                </a:tc>
+                <a:tc>
+                  <a:txBody>
+                    <a:bodyPr/>
+                    <a:lstStyle/>
+                    <a:p>
+                      <a:endParaRPr lang="en-CA" dirty="0"/>
+                    </a:p>
+                  </a:txBody>
+                  <a:tcPr/>
+                </a:tc>
+                <a:tc>
+                  <a:txBody>
+                    <a:bodyPr/>
+                    <a:lstStyle/>
+                    <a:p>
+                      <a:endParaRPr lang="en-CA" dirty="0"/>
+                    </a:p>
+                  </a:txBody>
+                  <a:tcPr/>
+                </a:tc>
+                <a:tc>
+                  <a:txBody>
+                    <a:bodyPr/>
+                    <a:lstStyle/>
+                    <a:p>
+                      <a:endParaRPr lang="en-CA" dirty="0"/>
+                    </a:p>
+                  </a:txBody>
+                  <a:tcPr/>
+                </a:tc>
+                <a:extLst>
+                  <a:ext uri="{0D108BD9-81ED-4DB2-BD59-A6C34878D82A}">
+                    <a16:rowId xmlns:a16="http://schemas.microsoft.com/office/drawing/2014/main" val="1519851890"/>
+                  </a:ext>
+                </a:extLst>
+              </a:tr>
+              <a:tr h="370840">
+                <a:tc>
+                  <a:txBody>
+                    <a:bodyPr/>
+                    <a:lstStyle/>
+                    <a:p>
+                      <a:endParaRPr lang="en-CA" dirty="0"/>
+                    </a:p>
+                  </a:txBody>
+                  <a:tcPr/>
+                </a:tc>
+                <a:tc>
+                  <a:txBody>
+                    <a:bodyPr/>
+                    <a:lstStyle/>
+                    <a:p>
+                      <a:endParaRPr lang="en-CA" dirty="0"/>
+                    </a:p>
+                  </a:txBody>
+                  <a:tcPr/>
+                </a:tc>
+                <a:tc>
+                  <a:txBody>
+                    <a:bodyPr/>
+                    <a:lstStyle/>
+                    <a:p>
+                      <a:endParaRPr lang="en-CA" dirty="0"/>
+                    </a:p>
+                  </a:txBody>
+                  <a:tcPr/>
+                </a:tc>
+                <a:tc>
+                  <a:txBody>
+                    <a:bodyPr/>
+                    <a:lstStyle/>
+                    <a:p>
+                      <a:endParaRPr lang="en-CA" dirty="0"/>
+                    </a:p>
+                  </a:txBody>
+                  <a:tcPr/>
+                </a:tc>
+                <a:tc>
+                  <a:txBody>
+                    <a:bodyPr/>
+                    <a:lstStyle/>
+                    <a:p>
+                      <a:endParaRPr lang="en-CA" dirty="0"/>
+                    </a:p>
+                  </a:txBody>
+                  <a:tcPr/>
+                </a:tc>
+                <a:extLst>
+                  <a:ext uri="{0D108BD9-81ED-4DB2-BD59-A6C34878D82A}">
+                    <a16:rowId xmlns:a16="http://schemas.microsoft.com/office/drawing/2014/main" val="1761035812"/>
+                  </a:ext>
+                </a:extLst>
+              </a:tr>
+              <a:tr h="370840">
+                <a:tc>
+                  <a:txBody>
+                    <a:bodyPr/>
+                    <a:lstStyle/>
+                    <a:p>
+                      <a:endParaRPr lang="en-CA" dirty="0"/>
+                    </a:p>
+                  </a:txBody>
+                  <a:tcPr/>
+                </a:tc>
+                <a:tc>
+                  <a:txBody>
+                    <a:bodyPr/>
+                    <a:lstStyle/>
+                    <a:p>
+                      <a:endParaRPr lang="en-CA" dirty="0"/>
+                    </a:p>
+                  </a:txBody>
+                  <a:tcPr/>
+                </a:tc>
+                <a:tc>
+                  <a:txBody>
+                    <a:bodyPr/>
+                    <a:lstStyle/>
+                    <a:p>
+                      <a:endParaRPr lang="en-CA" dirty="0"/>
+                    </a:p>
+                  </a:txBody>
+                  <a:tcPr/>
+                </a:tc>
+                <a:tc>
+                  <a:txBody>
+                    <a:bodyPr/>
+                    <a:lstStyle/>
+                    <a:p>
+                      <a:endParaRPr lang="en-CA" dirty="0"/>
+                    </a:p>
+                  </a:txBody>
+                  <a:tcPr/>
+                </a:tc>
+                <a:tc>
+                  <a:txBody>
+                    <a:bodyPr/>
+                    <a:lstStyle/>
+                    <a:p>
+                      <a:endParaRPr lang="en-CA" dirty="0"/>
+                    </a:p>
+                  </a:txBody>
+                  <a:tcPr/>
+                </a:tc>
+                <a:extLst>
+                  <a:ext uri="{0D108BD9-81ED-4DB2-BD59-A6C34878D82A}">
+                    <a16:rowId xmlns:a16="http://schemas.microsoft.com/office/drawing/2014/main" val="1021781723"/>
+                  </a:ext>
+                </a:extLst>
+              </a:tr>
+              <a:tr h="370840">
+                <a:tc>
+                  <a:txBody>
+                    <a:bodyPr/>
+                    <a:lstStyle/>
+                    <a:p>
+                      <a:endParaRPr lang="en-CA" dirty="0"/>
+                    </a:p>
+                  </a:txBody>
+                  <a:tcPr/>
+                </a:tc>
+                <a:tc>
+                  <a:txBody>
+                    <a:bodyPr/>
+                    <a:lstStyle/>
+                    <a:p>
+                      <a:endParaRPr lang="en-CA" dirty="0"/>
+                    </a:p>
+                  </a:txBody>
+                  <a:tcPr/>
+                </a:tc>
+                <a:tc>
+                  <a:txBody>
+                    <a:bodyPr/>
+                    <a:lstStyle/>
+                    <a:p>
+                      <a:endParaRPr lang="en-CA" dirty="0"/>
+                    </a:p>
+                  </a:txBody>
+                  <a:tcPr/>
+                </a:tc>
+                <a:tc>
+                  <a:txBody>
+                    <a:bodyPr/>
+                    <a:lstStyle/>
+                    <a:p>
+                      <a:endParaRPr lang="en-CA" dirty="0"/>
+                    </a:p>
+                  </a:txBody>
+                  <a:tcPr/>
+                </a:tc>
+                <a:tc>
+                  <a:txBody>
+                    <a:bodyPr/>
+                    <a:lstStyle/>
+                    <a:p>
+                      <a:endParaRPr lang="en-CA" dirty="0"/>
+                    </a:p>
+                  </a:txBody>
+                  <a:tcPr/>
+                </a:tc>
+                <a:extLst>
+                  <a:ext uri="{0D108BD9-81ED-4DB2-BD59-A6C34878D82A}">
+                    <a16:rowId xmlns:a16="http://schemas.microsoft.com/office/drawing/2014/main" val="3857353229"/>
+                  </a:ext>
+                </a:extLst>
+              </a:tr>
+              <a:tr h="370840">
+                <a:tc>
+                  <a:txBody>
+                    <a:bodyPr/>
+                    <a:lstStyle/>
+                    <a:p>
+                      <a:endParaRPr lang="en-CA" dirty="0"/>
+                    </a:p>
+                  </a:txBody>
+                  <a:tcPr/>
+                </a:tc>
+                <a:tc>
+                  <a:txBody>
+                    <a:bodyPr/>
+                    <a:lstStyle/>
+                    <a:p>
+                      <a:endParaRPr lang="en-CA" dirty="0"/>
+                    </a:p>
+                  </a:txBody>
+                  <a:tcPr/>
+                </a:tc>
+                <a:tc>
+                  <a:txBody>
+                    <a:bodyPr/>
+                    <a:lstStyle/>
+                    <a:p>
+                      <a:endParaRPr lang="en-CA" dirty="0"/>
+                    </a:p>
+                  </a:txBody>
+                  <a:tcPr/>
+                </a:tc>
+                <a:tc>
+                  <a:txBody>
+                    <a:bodyPr/>
+                    <a:lstStyle/>
+                    <a:p>
+                      <a:endParaRPr lang="en-CA" dirty="0"/>
+                    </a:p>
+                  </a:txBody>
+                  <a:tcPr/>
+                </a:tc>
+                <a:tc>
+                  <a:txBody>
+                    <a:bodyPr/>
+                    <a:lstStyle/>
+                    <a:p>
+                      <a:endParaRPr lang="en-CA" dirty="0"/>
+                    </a:p>
+                  </a:txBody>
+                  <a:tcPr/>
+                </a:tc>
+                <a:extLst>
+                  <a:ext uri="{0D108BD9-81ED-4DB2-BD59-A6C34878D82A}">
+                    <a16:rowId xmlns:a16="http://schemas.microsoft.com/office/drawing/2014/main" val="1343146158"/>
+                  </a:ext>
+                </a:extLst>
+              </a:tr>
+              <a:tr h="370840">
+                <a:tc>
+                  <a:txBody>
+                    <a:bodyPr/>
+                    <a:lstStyle/>
+                    <a:p>
+                      <a:endParaRPr lang="en-CA" dirty="0"/>
+                    </a:p>
+                  </a:txBody>
+                  <a:tcPr/>
+                </a:tc>
+                <a:tc>
+                  <a:txBody>
+                    <a:bodyPr/>
+                    <a:lstStyle/>
+                    <a:p>
+                      <a:endParaRPr lang="en-CA" dirty="0"/>
+                    </a:p>
+                  </a:txBody>
+                  <a:tcPr/>
+                </a:tc>
+                <a:tc>
+                  <a:txBody>
+                    <a:bodyPr/>
+                    <a:lstStyle/>
+                    <a:p>
+                      <a:endParaRPr lang="en-CA" dirty="0"/>
+                    </a:p>
+                  </a:txBody>
+                  <a:tcPr/>
+                </a:tc>
+                <a:tc>
+                  <a:txBody>
+                    <a:bodyPr/>
+                    <a:lstStyle/>
+                    <a:p>
+                      <a:endParaRPr lang="en-CA" dirty="0"/>
+                    </a:p>
+                  </a:txBody>
+                  <a:tcPr/>
+                </a:tc>
+                <a:tc>
+                  <a:txBody>
+                    <a:bodyPr/>
+                    <a:lstStyle/>
+                    <a:p>
+                      <a:endParaRPr lang="en-CA" dirty="0"/>
+                    </a:p>
+                  </a:txBody>
+                  <a:tcPr/>
+                </a:tc>
+                <a:extLst>
+                  <a:ext uri="{0D108BD9-81ED-4DB2-BD59-A6C34878D82A}">
+                    <a16:rowId xmlns:a16="http://schemas.microsoft.com/office/drawing/2014/main" val="1515650617"/>
+                  </a:ext>
+                </a:extLst>
+              </a:tr>
+              <a:tr h="370840">
+                <a:tc>
+                  <a:txBody>
+                    <a:bodyPr/>
+                    <a:lstStyle/>
+                    <a:p>
+                      <a:endParaRPr lang="en-CA" dirty="0"/>
+                    </a:p>
+                  </a:txBody>
+                  <a:tcPr/>
+                </a:tc>
+                <a:tc>
+                  <a:txBody>
+                    <a:bodyPr/>
+                    <a:lstStyle/>
+                    <a:p>
+                      <a:endParaRPr lang="en-CA" dirty="0"/>
+                    </a:p>
+                  </a:txBody>
+                  <a:tcPr/>
+                </a:tc>
+                <a:tc>
+                  <a:txBody>
+                    <a:bodyPr/>
+                    <a:lstStyle/>
+                    <a:p>
+                      <a:endParaRPr lang="en-CA" dirty="0"/>
+                    </a:p>
+                  </a:txBody>
+                  <a:tcPr/>
+                </a:tc>
+                <a:tc>
+                  <a:txBody>
+                    <a:bodyPr/>
+                    <a:lstStyle/>
+                    <a:p>
+                      <a:endParaRPr lang="en-CA" dirty="0"/>
+                    </a:p>
+                  </a:txBody>
+                  <a:tcPr/>
+                </a:tc>
+                <a:tc>
+                  <a:txBody>
+                    <a:bodyPr/>
+                    <a:lstStyle/>
+                    <a:p>
+                      <a:endParaRPr lang="en-CA" dirty="0"/>
+                    </a:p>
+                  </a:txBody>
+                  <a:tcPr/>
+                </a:tc>
+                <a:extLst>
+                  <a:ext uri="{0D108BD9-81ED-4DB2-BD59-A6C34878D82A}">
+                    <a16:rowId xmlns:a16="http://schemas.microsoft.com/office/drawing/2014/main" val="1037442498"/>
+                  </a:ext>
+                </a:extLst>
+              </a:tr>
+            </a:tbl>
+          </a:graphicData>
+        </a:graphic>
+      </p:graphicFrame>
+      <p:sp>
+        <p:nvSpPr>
+          <p:cNvPr id="5" name="TextBox 4">
+            <a:extLst>
+              <a:ext uri="{FF2B5EF4-FFF2-40B4-BE49-F238E27FC236}">
+                <a16:creationId xmlns:a16="http://schemas.microsoft.com/office/drawing/2014/main" id="{F7363916-EBEF-44A9-B87A-2B6804AF5E64}"/>
+              </a:ext>
+            </a:extLst>
+          </p:cNvPr>
+          <p:cNvSpPr txBox="1"/>
+          <p:nvPr/>
+        </p:nvSpPr>
+        <p:spPr>
+          <a:xfrm>
+            <a:off x="0" y="1908914"/>
+            <a:ext cx="1638773" cy="369332"/>
+          </a:xfrm>
+          <a:prstGeom prst="rect">
+            <a:avLst/>
+          </a:prstGeom>
+          <a:noFill/>
+        </p:spPr>
+        <p:txBody>
+          <a:bodyPr wrap="square" rtlCol="0">
+            <a:spAutoFit/>
+          </a:bodyPr>
+          <a:lstStyle/>
+          <a:p>
+            <a:r>
+              <a:rPr lang="en-CA" dirty="0"/>
+              <a:t>dH-1</a:t>
+            </a:r>
+          </a:p>
+        </p:txBody>
+      </p:sp>
+      <p:sp>
+        <p:nvSpPr>
+          <p:cNvPr id="7" name="TextBox 6">
+            <a:extLst>
+              <a:ext uri="{FF2B5EF4-FFF2-40B4-BE49-F238E27FC236}">
+                <a16:creationId xmlns:a16="http://schemas.microsoft.com/office/drawing/2014/main" id="{FA9FDB06-0454-480E-901E-FCE8EAAEC31A}"/>
+              </a:ext>
+            </a:extLst>
+          </p:cNvPr>
+          <p:cNvSpPr txBox="1"/>
+          <p:nvPr/>
+        </p:nvSpPr>
+        <p:spPr>
+          <a:xfrm>
+            <a:off x="0" y="2278246"/>
+            <a:ext cx="1638773" cy="369332"/>
+          </a:xfrm>
+          <a:prstGeom prst="rect">
+            <a:avLst/>
+          </a:prstGeom>
+          <a:noFill/>
+        </p:spPr>
+        <p:txBody>
+          <a:bodyPr wrap="square" rtlCol="0">
+            <a:spAutoFit/>
+          </a:bodyPr>
+          <a:lstStyle/>
+          <a:p>
+            <a:r>
+              <a:rPr lang="en-CA" dirty="0"/>
+              <a:t>dH-2</a:t>
+            </a:r>
+          </a:p>
+        </p:txBody>
+      </p:sp>
+    </p:spTree>
+    <p:extLst>
+      <p:ext uri="{BB962C8B-B14F-4D97-AF65-F5344CB8AC3E}">
+        <p14:creationId xmlns:p14="http://schemas.microsoft.com/office/powerpoint/2010/main" val="3806787014"/>
       </p:ext>
     </p:extLst>
   </p:cSld>

</xml_diff>